<commit_message>
Repo cleanup: remove build artifacts, add demo GIF and demo.db
- Remove compiled Tacit.app binary (2.9MB)
- Remove internal planning docs (VIDEO-RECORDING-PLAN, DEMO-SCRIPT, COMPARISON_REPORT)
- Remove slide build workspace artifacts (pptx-workspace/, slides/)
- Remove stray files (generated-CLAUDE.md, extraction_log.txt)
- Add CLI demo GIF to README (recorded with vhs)
- Add demo.db for judges to run --skip-extract --summary
- Consolidate README: merge duplicate Try It Now / Quick Start sections
- Update .gitignore for Tacit.app, workspace dirs, db backups

Co-Authored-By: Claude Opus 4.6 <noreply@anthropic.com>
</commit_message>
<xml_diff>
--- a/tacit/backend/demo-db/tacit-demo.pptx
+++ b/tacit/backend/demo-db/tacit-demo.pptx
@@ -4,18 +4,19 @@
   <p:sldMasterIdLst>
     <p:sldMasterId id="2147483648" r:id="rId1"/>
   </p:sldMasterIdLst>
+  <p:notesMasterIdLst>
+    <p:notesMasterId r:id="rId9"/>
+  </p:notesMasterIdLst>
   <p:sldIdLst>
     <p:sldId id="256" r:id="rId2"/>
     <p:sldId id="257" r:id="rId3"/>
     <p:sldId id="258" r:id="rId4"/>
-    <p:sldId id="259" r:id="rId5"/>
-    <p:sldId id="260" r:id="rId6"/>
-    <p:sldId id="261" r:id="rId7"/>
+    <p:sldId id="262" r:id="rId5"/>
+    <p:sldId id="259" r:id="rId6"/>
+    <p:sldId id="260" r:id="rId7"/>
+    <p:sldId id="261" r:id="rId8"/>
   </p:sldIdLst>
-  <p:notesMasterIdLst>
-    <p:notesMasterId r:id="rId8"/>
-  </p:notesMasterIdLst>
-  <p:sldSz cx="9144000" cy="5143500"/>
+  <p:sldSz cx="9144000" cy="5143500" type="screen16x9"/>
   <p:notesSz cx="5143500" cy="9144000"/>
   <p:defaultTextStyle>
     <a:lvl1pPr marL="0" algn="l" defTabSz="914400" rtl="0" eaLnBrk="1" latinLnBrk="0" hangingPunct="1">
@@ -109,6 +110,11 @@
       </a:defRPr>
     </a:lvl9pPr>
   </p:defaultTextStyle>
+  <p:extLst>
+    <p:ext uri="{EFAFB233-063F-42B5-8137-9DF3F51BA10A}">
+      <p15:sldGuideLst xmlns:p15="http://schemas.microsoft.com/office/powerpoint/2012/main"/>
+    </p:ext>
+  </p:extLst>
 </p:presentation>
 </file>
 
@@ -134,234 +140,10 @@
           <a:chExt cx="0" cy="0"/>
         </a:xfrm>
       </p:grpSpPr>
-      <p:sp>
-        <p:nvSpPr>
-          <p:cNvPr id="2" name="Header Placeholder 1"/>
-          <p:cNvSpPr>
-            <a:spLocks noGrp="1"/>
-          </p:cNvSpPr>
-          <p:nvPr>
-            <p:ph type="hdr" sz="quarter"/>
-          </p:nvPr>
-        </p:nvSpPr>
-        <p:spPr>
-          <a:xfrm>
-            <a:off x="0" y="0"/>
-            <a:ext cx="2971800" cy="458788"/>
-          </a:xfrm>
-          <a:prstGeom prst="rect">
-            <a:avLst/>
-          </a:prstGeom>
-        </p:spPr>
-        <p:txBody>
-          <a:bodyPr vert="horz" lIns="91440" tIns="45720" rIns="91440" bIns="45720" rtlCol="0"/>
-          <a:lstStyle>
-            <a:lvl1pPr algn="l">
-              <a:defRPr sz="1200"/>
-            </a:lvl1pPr>
-          </a:lstStyle>
-          <a:p>
-            <a:endParaRPr lang="en-US"/>
-          </a:p>
-        </p:txBody>
-      </p:sp>
-      <p:sp>
-        <p:nvSpPr>
-          <p:cNvPr id="3" name="Date Placeholder 2"/>
-          <p:cNvSpPr>
-            <a:spLocks noGrp="1"/>
-          </p:cNvSpPr>
-          <p:nvPr>
-            <p:ph type="dt" idx="1"/>
-          </p:nvPr>
-        </p:nvSpPr>
-        <p:spPr>
-          <a:xfrm>
-            <a:off x="3884613" y="0"/>
-            <a:ext cx="2971800" cy="458788"/>
-          </a:xfrm>
-          <a:prstGeom prst="rect">
-            <a:avLst/>
-          </a:prstGeom>
-        </p:spPr>
-        <p:txBody>
-          <a:bodyPr vert="horz" lIns="91440" tIns="45720" rIns="91440" bIns="45720" rtlCol="0"/>
-          <a:lstStyle>
-            <a:lvl1pPr algn="r">
-              <a:defRPr sz="1200"/>
-            </a:lvl1pPr>
-          </a:lstStyle>
-          <a:p>
-            <a:fld id="{5282F153-3F37-0F45-9E97-73ACFA13230C}" type="datetimeFigureOut">
-              <a:rPr lang="en-US"/>
-              <a:t>7/23/19</a:t>
-            </a:fld>
-            <a:endParaRPr lang="en-US"/>
-          </a:p>
-        </p:txBody>
-      </p:sp>
-      <p:sp>
-        <p:nvSpPr>
-          <p:cNvPr id="4" name="Slide Image Placeholder 3"/>
-          <p:cNvSpPr>
-            <a:spLocks noGrp="1" noRot="1" noChangeAspect="1"/>
-          </p:cNvSpPr>
-          <p:nvPr>
-            <p:ph type="sldImg" idx="2"/>
-          </p:nvPr>
-        </p:nvSpPr>
-        <p:spPr>
-          <a:xfrm>
-            <a:off x="685800" y="1143000"/>
-            <a:ext cx="5486400" cy="3086100"/>
-          </a:xfrm>
-          <a:prstGeom prst="rect">
-            <a:avLst/>
-          </a:prstGeom>
-          <a:noFill/>
-          <a:ln w="12700">
-            <a:solidFill>
-              <a:prstClr val="black"/>
-            </a:solidFill>
-          </a:ln>
-        </p:spPr>
-        <p:txBody>
-          <a:bodyPr vert="horz" lIns="91440" tIns="45720" rIns="91440" bIns="45720" rtlCol="0" anchor="ctr"/>
-          <a:lstStyle/>
-          <a:p>
-            <a:endParaRPr lang="en-US"/>
-          </a:p>
-        </p:txBody>
-      </p:sp>
-      <p:sp>
-        <p:nvSpPr>
-          <p:cNvPr id="5" name="Notes Placeholder 4"/>
-          <p:cNvSpPr>
-            <a:spLocks noGrp="1"/>
-          </p:cNvSpPr>
-          <p:nvPr>
-            <p:ph type="body" sz="quarter" idx="3"/>
-          </p:nvPr>
-        </p:nvSpPr>
-        <p:spPr>
-          <a:xfrm>
-            <a:off x="685800" y="4400550"/>
-            <a:ext cx="5486400" cy="3600450"/>
-          </a:xfrm>
-          <a:prstGeom prst="rect">
-            <a:avLst/>
-          </a:prstGeom>
-        </p:spPr>
-        <p:txBody>
-          <a:bodyPr vert="horz" lIns="91440" tIns="45720" rIns="91440" bIns="45720" rtlCol="0"/>
-          <a:lstStyle/>
-          <a:p>
-            <a:pPr lvl="0"/>
-            <a:r>
-              <a:rPr lang="en-US"/>
-              <a:t>Click to edit Master text styles</a:t>
-            </a:r>
-          </a:p>
-          <a:p>
-            <a:pPr lvl="1"/>
-            <a:r>
-              <a:rPr lang="en-US"/>
-              <a:t>Second level</a:t>
-            </a:r>
-          </a:p>
-          <a:p>
-            <a:pPr lvl="2"/>
-            <a:r>
-              <a:rPr lang="en-US"/>
-              <a:t>Third level</a:t>
-            </a:r>
-          </a:p>
-          <a:p>
-            <a:pPr lvl="3"/>
-            <a:r>
-              <a:rPr lang="en-US"/>
-              <a:t>Fourth level</a:t>
-            </a:r>
-          </a:p>
-          <a:p>
-            <a:pPr lvl="4"/>
-            <a:r>
-              <a:rPr lang="en-US"/>
-              <a:t>Fifth level</a:t>
-            </a:r>
-          </a:p>
-        </p:txBody>
-      </p:sp>
-      <p:sp>
-        <p:nvSpPr>
-          <p:cNvPr id="6" name="Footer Placeholder 5"/>
-          <p:cNvSpPr>
-            <a:spLocks noGrp="1"/>
-          </p:cNvSpPr>
-          <p:nvPr>
-            <p:ph type="ftr" sz="quarter" idx="4"/>
-          </p:nvPr>
-        </p:nvSpPr>
-        <p:spPr>
-          <a:xfrm>
-            <a:off x="0" y="8685213"/>
-            <a:ext cx="2971800" cy="458787"/>
-          </a:xfrm>
-          <a:prstGeom prst="rect">
-            <a:avLst/>
-          </a:prstGeom>
-        </p:spPr>
-        <p:txBody>
-          <a:bodyPr vert="horz" lIns="91440" tIns="45720" rIns="91440" bIns="45720" rtlCol="0" anchor="b"/>
-          <a:lstStyle>
-            <a:lvl1pPr algn="l">
-              <a:defRPr sz="1200"/>
-            </a:lvl1pPr>
-          </a:lstStyle>
-          <a:p>
-            <a:endParaRPr lang="en-US"/>
-          </a:p>
-        </p:txBody>
-      </p:sp>
-      <p:sp>
-        <p:nvSpPr>
-          <p:cNvPr id="7" name="Slide Number Placeholder 6"/>
-          <p:cNvSpPr>
-            <a:spLocks noGrp="1"/>
-          </p:cNvSpPr>
-          <p:nvPr>
-            <p:ph type="sldNum" sz="quarter" idx="5"/>
-          </p:nvPr>
-        </p:nvSpPr>
-        <p:spPr>
-          <a:xfrm>
-            <a:off x="3884613" y="8685213"/>
-            <a:ext cx="2971800" cy="458787"/>
-          </a:xfrm>
-          <a:prstGeom prst="rect">
-            <a:avLst/>
-          </a:prstGeom>
-        </p:spPr>
-        <p:txBody>
-          <a:bodyPr vert="horz" lIns="91440" tIns="45720" rIns="91440" bIns="45720" rtlCol="0" anchor="b"/>
-          <a:lstStyle>
-            <a:lvl1pPr algn="r">
-              <a:defRPr sz="1200"/>
-            </a:lvl1pPr>
-          </a:lstStyle>
-          <a:p>
-            <a:fld id="{CE5E9CC1-C706-0F49-92D6-E571CC5EEA8F}" type="slidenum">
-              <a:rPr lang="en-US"/>
-              <a:t>‹#›</a:t>
-            </a:fld>
-            <a:endParaRPr lang="en-US"/>
-          </a:p>
-        </p:txBody>
-      </p:sp>
     </p:spTree>
     <p:extLst>
       <p:ext uri="{BB962C8B-B14F-4D97-AF65-F5344CB8AC3E}">
-        <p14:creationId xmlns:p14="http://schemas.microsoft.com/office/powerpoint/2010/main" val="1024086991"/>
+        <p14:creationId xmlns:p14="http://schemas.microsoft.com/office/powerpoint/2010/main" val="2071061477"/>
       </p:ext>
     </p:extLst>
   </p:cSld>
@@ -505,10 +287,6 @@
           <a:bodyPr/>
           <a:lstStyle/>
           <a:p>
-            <a:r>
-              <a:rPr lang="en-US" dirty="0"/>
-              <a:t/>
-            </a:r>
             <a:endParaRPr lang="en-US" dirty="0"/>
           </a:p>
         </p:txBody>
@@ -593,10 +371,6 @@
           <a:bodyPr/>
           <a:lstStyle/>
           <a:p>
-            <a:r>
-              <a:rPr lang="en-US" dirty="0"/>
-              <a:t/>
-            </a:r>
             <a:endParaRPr lang="en-US" dirty="0"/>
           </a:p>
         </p:txBody>
@@ -681,10 +455,6 @@
           <a:bodyPr/>
           <a:lstStyle/>
           <a:p>
-            <a:r>
-              <a:rPr lang="en-US" dirty="0"/>
-              <a:t/>
-            </a:r>
             <a:endParaRPr lang="en-US" dirty="0"/>
           </a:p>
         </p:txBody>
@@ -730,7 +500,13 @@
   <p:cSld>
     <p:spTree>
       <p:nvGrpSpPr>
-        <p:cNvPr id="1" name=""/>
+        <p:cNvPr id="1" name="">
+          <a:extLst>
+            <a:ext uri="{FF2B5EF4-FFF2-40B4-BE49-F238E27FC236}">
+              <a16:creationId xmlns:a16="http://schemas.microsoft.com/office/drawing/2014/main" id="{C05F1BC2-FA39-DB24-C239-E5E3182FA4BB}"/>
+            </a:ext>
+          </a:extLst>
+        </p:cNvPr>
         <p:cNvGrpSpPr/>
         <p:nvPr/>
       </p:nvGrpSpPr>
@@ -744,7 +520,13 @@
       </p:grpSpPr>
       <p:sp>
         <p:nvSpPr>
-          <p:cNvPr id="2" name="Slide Image Placeholder 1"/>
+          <p:cNvPr id="2" name="Slide Image Placeholder 1">
+            <a:extLst>
+              <a:ext uri="{FF2B5EF4-FFF2-40B4-BE49-F238E27FC236}">
+                <a16:creationId xmlns:a16="http://schemas.microsoft.com/office/drawing/2014/main" id="{4ADEE9EA-0F3A-F7F3-1E73-14AAFBACF573}"/>
+              </a:ext>
+            </a:extLst>
+          </p:cNvPr>
           <p:cNvSpPr>
             <a:spLocks noGrp="1" noRot="1" noChangeAspect="1"/>
           </p:cNvSpPr>
@@ -756,7 +538,13 @@
       </p:sp>
       <p:sp>
         <p:nvSpPr>
-          <p:cNvPr id="3" name="Notes Placeholder 2"/>
+          <p:cNvPr id="3" name="Notes Placeholder 2">
+            <a:extLst>
+              <a:ext uri="{FF2B5EF4-FFF2-40B4-BE49-F238E27FC236}">
+                <a16:creationId xmlns:a16="http://schemas.microsoft.com/office/drawing/2014/main" id="{FA47223B-D238-3649-9A67-9EBAC7C96788}"/>
+              </a:ext>
+            </a:extLst>
+          </p:cNvPr>
           <p:cNvSpPr>
             <a:spLocks noGrp="1"/>
           </p:cNvSpPr>
@@ -769,17 +557,19 @@
           <a:bodyPr/>
           <a:lstStyle/>
           <a:p>
-            <a:r>
-              <a:rPr lang="en-US" dirty="0"/>
-              <a:t/>
-            </a:r>
             <a:endParaRPr lang="en-US" dirty="0"/>
           </a:p>
         </p:txBody>
       </p:sp>
       <p:sp>
         <p:nvSpPr>
-          <p:cNvPr id="4" name="Slide Number Placeholder 3"/>
+          <p:cNvPr id="4" name="Slide Number Placeholder 3">
+            <a:extLst>
+              <a:ext uri="{FF2B5EF4-FFF2-40B4-BE49-F238E27FC236}">
+                <a16:creationId xmlns:a16="http://schemas.microsoft.com/office/drawing/2014/main" id="{8D09614E-469E-2E9D-9F8D-5921DED05AC0}"/>
+              </a:ext>
+            </a:extLst>
+          </p:cNvPr>
           <p:cNvSpPr>
             <a:spLocks noGrp="1"/>
           </p:cNvSpPr>
@@ -803,7 +593,7 @@
     </p:spTree>
     <p:extLst>
       <p:ext uri="{BB962C8B-B14F-4D97-AF65-F5344CB8AC3E}">
-        <p14:creationId xmlns:p14="http://schemas.microsoft.com/office/powerpoint/2010/main" val="1024086991"/>
+        <p14:creationId xmlns:p14="http://schemas.microsoft.com/office/powerpoint/2010/main" val="4218276415"/>
       </p:ext>
     </p:extLst>
   </p:cSld>
@@ -857,10 +647,6 @@
           <a:bodyPr/>
           <a:lstStyle/>
           <a:p>
-            <a:r>
-              <a:rPr lang="en-US" dirty="0"/>
-              <a:t/>
-            </a:r>
             <a:endParaRPr lang="en-US" dirty="0"/>
           </a:p>
         </p:txBody>
@@ -945,10 +731,6 @@
           <a:bodyPr/>
           <a:lstStyle/>
           <a:p>
-            <a:r>
-              <a:rPr lang="en-US" dirty="0"/>
-              <a:t/>
-            </a:r>
             <a:endParaRPr lang="en-US" dirty="0"/>
           </a:p>
         </p:txBody>
@@ -971,6 +753,90 @@
             <a:fld id="{F7021451-1387-4CA6-816F-3879F97B5CBC}" type="slidenum">
               <a:rPr lang="en-US"/>
               <a:t>6</a:t>
+            </a:fld>
+            <a:endParaRPr lang="en-US"/>
+          </a:p>
+        </p:txBody>
+      </p:sp>
+    </p:spTree>
+    <p:extLst>
+      <p:ext uri="{BB962C8B-B14F-4D97-AF65-F5344CB8AC3E}">
+        <p14:creationId xmlns:p14="http://schemas.microsoft.com/office/powerpoint/2010/main" val="1024086991"/>
+      </p:ext>
+    </p:extLst>
+  </p:cSld>
+  <p:clrMapOvr>
+    <a:masterClrMapping/>
+  </p:clrMapOvr>
+</p:notes>
+</file>
+
+<file path=ppt/notesSlides/notesSlide7.xml><?xml version="1.0" encoding="utf-8"?>
+<p:notes xmlns:a="http://schemas.openxmlformats.org/drawingml/2006/main" xmlns:r="http://schemas.openxmlformats.org/officeDocument/2006/relationships" xmlns:p="http://schemas.openxmlformats.org/presentationml/2006/main">
+  <p:cSld>
+    <p:spTree>
+      <p:nvGrpSpPr>
+        <p:cNvPr id="1" name=""/>
+        <p:cNvGrpSpPr/>
+        <p:nvPr/>
+      </p:nvGrpSpPr>
+      <p:grpSpPr>
+        <a:xfrm>
+          <a:off x="0" y="0"/>
+          <a:ext cx="0" cy="0"/>
+          <a:chOff x="0" y="0"/>
+          <a:chExt cx="0" cy="0"/>
+        </a:xfrm>
+      </p:grpSpPr>
+      <p:sp>
+        <p:nvSpPr>
+          <p:cNvPr id="2" name="Slide Image Placeholder 1"/>
+          <p:cNvSpPr>
+            <a:spLocks noGrp="1" noRot="1" noChangeAspect="1"/>
+          </p:cNvSpPr>
+          <p:nvPr>
+            <p:ph type="sldImg"/>
+          </p:nvPr>
+        </p:nvSpPr>
+        <p:spPr/>
+      </p:sp>
+      <p:sp>
+        <p:nvSpPr>
+          <p:cNvPr id="3" name="Notes Placeholder 2"/>
+          <p:cNvSpPr>
+            <a:spLocks noGrp="1"/>
+          </p:cNvSpPr>
+          <p:nvPr>
+            <p:ph type="body" idx="1"/>
+          </p:nvPr>
+        </p:nvSpPr>
+        <p:spPr/>
+        <p:txBody>
+          <a:bodyPr/>
+          <a:lstStyle/>
+          <a:p>
+            <a:endParaRPr lang="en-US" dirty="0"/>
+          </a:p>
+        </p:txBody>
+      </p:sp>
+      <p:sp>
+        <p:nvSpPr>
+          <p:cNvPr id="4" name="Slide Number Placeholder 3"/>
+          <p:cNvSpPr>
+            <a:spLocks noGrp="1"/>
+          </p:cNvSpPr>
+          <p:nvPr>
+            <p:ph type="sldNum" sz="quarter" idx="10"/>
+          </p:nvPr>
+        </p:nvSpPr>
+        <p:spPr/>
+        <p:txBody>
+          <a:bodyPr/>
+          <a:lstStyle/>
+          <a:p>
+            <a:fld id="{F7021451-1387-4CA6-816F-3879F97B5CBC}" type="slidenum">
+              <a:rPr lang="en-US"/>
+              <a:t>7</a:t>
             </a:fld>
             <a:endParaRPr lang="en-US"/>
           </a:p>
@@ -1022,6 +888,11 @@
 <file path=ppt/slideMasters/slideMaster1.xml><?xml version="1.0" encoding="utf-8"?>
 <p:sldMaster xmlns:a="http://schemas.openxmlformats.org/drawingml/2006/main" xmlns:r="http://schemas.openxmlformats.org/officeDocument/2006/relationships" xmlns:p="http://schemas.openxmlformats.org/presentationml/2006/main">
   <p:cSld>
+    <p:bg>
+      <p:bgRef idx="1001">
+        <a:schemeClr val="bg1"/>
+      </p:bgRef>
+    </p:bg>
     <p:spTree>
       <p:nvGrpSpPr>
         <p:cNvPr id="1" name=""/>
@@ -1315,14 +1186,14 @@
       </p:grpSpPr>
       <p:pic>
         <p:nvPicPr>
-          <p:cNvPr id="2" name="Image 0" descr="/Users/bayramannakov/GH/opus-4-6-hack/tacit/backend/demo-db/pptx-workspace/illustration-title.png">    </p:cNvPr>
+          <p:cNvPr id="2" name="Image 0" descr="/Users/bayramannakov/GH/opus-4-6-hack/tacit/backend/demo-db/pptx-workspace/illustration-title.png"/>
           <p:cNvPicPr>
             <a:picLocks noChangeAspect="1"/>
           </p:cNvPicPr>
           <p:nvPr/>
         </p:nvPicPr>
         <p:blipFill>
-          <a:blip r:embed="rId1"/>
+          <a:blip r:embed="rId3"/>
           <a:stretch>
             <a:fillRect/>
           </a:stretch>
@@ -1358,28 +1229,13 @@
           </a:solidFill>
           <a:ln/>
         </p:spPr>
-      </p:sp>
-      <p:sp>
-        <p:nvSpPr>
-          <p:cNvPr id="4" name="Shape 1"/>
-          <p:cNvSpPr/>
-          <p:nvPr/>
-        </p:nvSpPr>
-        <p:spPr>
-          <a:xfrm>
-            <a:off x="5029200" y="0"/>
-            <a:ext cx="1371600" cy="5143500"/>
-          </a:xfrm>
-          <a:prstGeom prst="rect">
-            <a:avLst/>
-          </a:prstGeom>
-          <a:solidFill>
-            <a:srgbClr val="0D1117">
-              <a:alpha val="50000"/>
-            </a:srgbClr>
-          </a:solidFill>
-          <a:ln/>
-        </p:spPr>
+        <p:txBody>
+          <a:bodyPr/>
+          <a:lstStyle/>
+          <a:p>
+            <a:endParaRPr lang="en-US"/>
+          </a:p>
+        </p:txBody>
       </p:sp>
       <p:sp>
         <p:nvSpPr>
@@ -1400,6 +1256,13 @@
           </a:solidFill>
           <a:ln/>
         </p:spPr>
+        <p:txBody>
+          <a:bodyPr/>
+          <a:lstStyle/>
+          <a:p>
+            <a:endParaRPr lang="en-US"/>
+          </a:p>
+        </p:txBody>
       </p:sp>
       <p:sp>
         <p:nvSpPr>
@@ -1422,11 +1285,11 @@
           <a:bodyPr wrap="square" rtlCol="0" anchor="ctr"/>
           <a:lstStyle/>
           <a:p>
-            <a:pPr indent="0" marL="0">
-              <a:buNone/>
-            </a:pPr>
-            <a:r>
-              <a:rPr lang="en-US" sz="6400" b="1" spc="800" kern="0" dirty="0">
+            <a:pPr marL="0" indent="0">
+              <a:buNone/>
+            </a:pPr>
+            <a:r>
+              <a:rPr lang="en-US" sz="6400" b="1" kern="0" spc="800" dirty="0">
                 <a:solidFill>
                   <a:srgbClr val="00D4AA"/>
                 </a:solidFill>
@@ -1461,7 +1324,7 @@
           <a:bodyPr wrap="square" rtlCol="0" anchor="ctr"/>
           <a:lstStyle/>
           <a:p>
-            <a:pPr indent="0" marL="0">
+            <a:pPr marL="0" indent="0">
               <a:buNone/>
             </a:pPr>
             <a:r>
@@ -1478,7 +1341,7 @@
             <a:endParaRPr lang="en-US" sz="2000" dirty="0"/>
           </a:p>
           <a:p>
-            <a:pPr indent="0" marL="0">
+            <a:pPr marL="0" indent="0">
               <a:buNone/>
             </a:pPr>
             <a:r>
@@ -1517,7 +1380,7 @@
           <a:bodyPr wrap="square" rtlCol="0" anchor="ctr"/>
           <a:lstStyle/>
           <a:p>
-            <a:pPr indent="0" marL="0">
+            <a:pPr marL="0" indent="0">
               <a:buNone/>
             </a:pPr>
             <a:r>
@@ -1551,6 +1414,7 @@
         <a:solidFill>
           <a:srgbClr val="0D1117"/>
         </a:solidFill>
+        <a:effectLst/>
       </p:bgPr>
     </p:bg>
     <p:spTree>
@@ -1590,7 +1454,7 @@
           <a:bodyPr wrap="square" rtlCol="0" anchor="ctr"/>
           <a:lstStyle/>
           <a:p>
-            <a:pPr indent="0" marL="0">
+            <a:pPr marL="0" indent="0">
               <a:buNone/>
             </a:pPr>
             <a:endParaRPr lang="en-US" dirty="0"/>
@@ -1618,7 +1482,7 @@
           <a:bodyPr wrap="square" lIns="0" tIns="0" rIns="0" bIns="0" rtlCol="0" anchor="t"/>
           <a:lstStyle/>
           <a:p>
-            <a:pPr algn="l" indent="0" marL="0">
+            <a:pPr marL="0" indent="0" algn="l">
               <a:spcAft>
                 <a:spcPts val="600"/>
               </a:spcAft>
@@ -1660,7 +1524,7 @@
           <a:bodyPr wrap="square" lIns="0" tIns="0" rIns="0" bIns="0" rtlCol="0" anchor="t"/>
           <a:lstStyle/>
           <a:p>
-            <a:pPr algn="l" indent="0" marL="0">
+            <a:pPr marL="0" indent="0" algn="l">
               <a:buNone/>
             </a:pPr>
             <a:r>
@@ -1709,7 +1573,7 @@
           <a:bodyPr wrap="square" rtlCol="0" anchor="ctr"/>
           <a:lstStyle/>
           <a:p>
-            <a:pPr indent="0" marL="0">
+            <a:pPr marL="0" indent="0">
               <a:buNone/>
             </a:pPr>
             <a:endParaRPr lang="en-US" dirty="0"/>
@@ -1737,7 +1601,7 @@
           <a:bodyPr wrap="square" lIns="0" tIns="0" rIns="0" bIns="0" rtlCol="0" anchor="t"/>
           <a:lstStyle/>
           <a:p>
-            <a:pPr algn="ctr" indent="0" marL="0">
+            <a:pPr marL="0" indent="0" algn="ctr">
               <a:spcAft>
                 <a:spcPts val="600"/>
               </a:spcAft>
@@ -1779,7 +1643,7 @@
           <a:bodyPr wrap="square" lIns="0" tIns="0" rIns="0" bIns="0" rtlCol="0" anchor="t"/>
           <a:lstStyle/>
           <a:p>
-            <a:pPr algn="ctr" indent="0" marL="0">
+            <a:pPr marL="0" indent="0" algn="ctr">
               <a:buNone/>
             </a:pPr>
             <a:r>
@@ -1818,7 +1682,7 @@
           <a:bodyPr wrap="square" lIns="0" tIns="0" rIns="0" bIns="0" rtlCol="0" anchor="t"/>
           <a:lstStyle/>
           <a:p>
-            <a:pPr algn="l" indent="0" marL="0">
+            <a:pPr marL="0" indent="0" algn="l">
               <a:buNone/>
             </a:pPr>
             <a:r>
@@ -1867,7 +1731,7 @@
           <a:bodyPr wrap="square" rtlCol="0" anchor="ctr"/>
           <a:lstStyle/>
           <a:p>
-            <a:pPr indent="0" marL="0">
+            <a:pPr marL="0" indent="0">
               <a:buNone/>
             </a:pPr>
             <a:endParaRPr lang="en-US" dirty="0"/>
@@ -1895,7 +1759,7 @@
           <a:bodyPr wrap="square" lIns="0" tIns="0" rIns="0" bIns="0" rtlCol="0" anchor="t"/>
           <a:lstStyle/>
           <a:p>
-            <a:pPr algn="ctr" indent="0" marL="0">
+            <a:pPr marL="0" indent="0" algn="ctr">
               <a:spcAft>
                 <a:spcPts val="600"/>
               </a:spcAft>
@@ -1937,7 +1801,7 @@
           <a:bodyPr wrap="square" lIns="0" tIns="0" rIns="0" bIns="0" rtlCol="0" anchor="t"/>
           <a:lstStyle/>
           <a:p>
-            <a:pPr algn="ctr" indent="0" marL="0">
+            <a:pPr marL="0" indent="0" algn="ctr">
               <a:buNone/>
             </a:pPr>
             <a:r>
@@ -1976,7 +1840,7 @@
           <a:bodyPr wrap="square" lIns="0" tIns="0" rIns="0" bIns="0" rtlCol="0" anchor="t"/>
           <a:lstStyle/>
           <a:p>
-            <a:pPr algn="l" indent="0" marL="0">
+            <a:pPr marL="0" indent="0" algn="l">
               <a:buNone/>
             </a:pPr>
             <a:r>
@@ -2025,7 +1889,7 @@
           <a:bodyPr wrap="square" rtlCol="0" anchor="ctr"/>
           <a:lstStyle/>
           <a:p>
-            <a:pPr indent="0" marL="0">
+            <a:pPr marL="0" indent="0">
               <a:buNone/>
             </a:pPr>
             <a:endParaRPr lang="en-US" dirty="0"/>
@@ -2053,7 +1917,7 @@
           <a:bodyPr wrap="square" lIns="0" tIns="0" rIns="0" bIns="0" rtlCol="0" anchor="t"/>
           <a:lstStyle/>
           <a:p>
-            <a:pPr algn="ctr" indent="0" marL="0">
+            <a:pPr marL="0" indent="0" algn="ctr">
               <a:spcAft>
                 <a:spcPts val="600"/>
               </a:spcAft>
@@ -2095,7 +1959,7 @@
           <a:bodyPr wrap="square" lIns="0" tIns="0" rIns="0" bIns="0" rtlCol="0" anchor="t"/>
           <a:lstStyle/>
           <a:p>
-            <a:pPr algn="ctr" indent="0" marL="0">
+            <a:pPr marL="0" indent="0" algn="ctr">
               <a:buNone/>
             </a:pPr>
             <a:r>
@@ -2134,7 +1998,7 @@
           <a:bodyPr wrap="square" lIns="0" tIns="0" rIns="0" bIns="0" rtlCol="0" anchor="t"/>
           <a:lstStyle/>
           <a:p>
-            <a:pPr algn="ctr" indent="0" marL="0">
+            <a:pPr marL="0" indent="0" algn="ctr">
               <a:buNone/>
             </a:pPr>
             <a:r>
@@ -2148,9 +2012,6 @@
               </a:rPr>
               <a:t>But that knowledge </a:t>
             </a:r>
-            <a:pPr algn="ctr" indent="0" marL="0">
-              <a:buNone/>
-            </a:pPr>
             <a:r>
               <a:rPr lang="en-US" sz="1400" b="1" dirty="0">
                 <a:solidFill>
@@ -2162,9 +2023,6 @@
               </a:rPr>
               <a:t>is</a:t>
             </a:r>
-            <a:pPr algn="ctr" indent="0" marL="0">
-              <a:buNone/>
-            </a:pPr>
             <a:r>
               <a:rPr lang="en-US" sz="1400" dirty="0">
                 <a:solidFill>
@@ -2196,6 +2054,7 @@
         <a:solidFill>
           <a:srgbClr val="0D1117"/>
         </a:solidFill>
+        <a:effectLst/>
       </p:bgPr>
     </p:bg>
     <p:spTree>
@@ -2235,7 +2094,7 @@
           <a:bodyPr wrap="square" rtlCol="0" anchor="ctr"/>
           <a:lstStyle/>
           <a:p>
-            <a:pPr indent="0" marL="0">
+            <a:pPr marL="0" indent="0">
               <a:buNone/>
             </a:pPr>
             <a:endParaRPr lang="en-US" dirty="0"/>
@@ -2263,7 +2122,7 @@
           <a:bodyPr wrap="square" lIns="0" tIns="0" rIns="0" bIns="0" rtlCol="0" anchor="t"/>
           <a:lstStyle/>
           <a:p>
-            <a:pPr algn="l" indent="0" marL="0">
+            <a:pPr marL="0" indent="0" algn="l">
               <a:buNone/>
             </a:pPr>
             <a:r>
@@ -2302,7 +2161,7 @@
           <a:bodyPr wrap="square" lIns="0" tIns="0" rIns="0" bIns="0" rtlCol="0" anchor="t"/>
           <a:lstStyle/>
           <a:p>
-            <a:pPr algn="l" indent="0" marL="0">
+            <a:pPr marL="0" indent="0" algn="l">
               <a:spcBef>
                 <a:spcPts val="400"/>
               </a:spcBef>
@@ -2354,7 +2213,7 @@
           <a:bodyPr wrap="square" rtlCol="0" anchor="ctr"/>
           <a:lstStyle/>
           <a:p>
-            <a:pPr indent="0" marL="0">
+            <a:pPr marL="0" indent="0">
               <a:buNone/>
             </a:pPr>
             <a:endParaRPr lang="en-US" dirty="0"/>
@@ -2382,7 +2241,7 @@
           <a:bodyPr wrap="square" lIns="0" tIns="0" rIns="0" bIns="0" rtlCol="0" anchor="t"/>
           <a:lstStyle/>
           <a:p>
-            <a:pPr algn="ctr" indent="0" marL="0">
+            <a:pPr marL="0" indent="0" algn="ctr">
               <a:spcAft>
                 <a:spcPts val="400"/>
               </a:spcAft>
@@ -2424,7 +2283,7 @@
           <a:bodyPr wrap="square" lIns="0" tIns="0" rIns="0" bIns="0" rtlCol="0" anchor="t"/>
           <a:lstStyle/>
           <a:p>
-            <a:pPr algn="ctr" indent="0" marL="0">
+            <a:pPr marL="0" indent="0" algn="ctr">
               <a:buNone/>
             </a:pPr>
             <a:r>
@@ -2463,7 +2322,7 @@
           <a:bodyPr wrap="square" lIns="0" tIns="0" rIns="0" bIns="0" rtlCol="0" anchor="t"/>
           <a:lstStyle/>
           <a:p>
-            <a:pPr algn="l" indent="0" marL="0">
+            <a:pPr marL="0" indent="0" algn="l">
               <a:buNone/>
             </a:pPr>
             <a:r>
@@ -2512,7 +2371,7 @@
           <a:bodyPr wrap="square" rtlCol="0" anchor="ctr"/>
           <a:lstStyle/>
           <a:p>
-            <a:pPr indent="0" marL="0">
+            <a:pPr marL="0" indent="0">
               <a:buNone/>
             </a:pPr>
             <a:endParaRPr lang="en-US" dirty="0"/>
@@ -2540,7 +2399,7 @@
           <a:bodyPr wrap="square" lIns="0" tIns="0" rIns="0" bIns="0" rtlCol="0" anchor="t"/>
           <a:lstStyle/>
           <a:p>
-            <a:pPr algn="ctr" indent="0" marL="0">
+            <a:pPr marL="0" indent="0" algn="ctr">
               <a:spcAft>
                 <a:spcPts val="400"/>
               </a:spcAft>
@@ -2582,7 +2441,7 @@
           <a:bodyPr wrap="square" lIns="0" tIns="0" rIns="0" bIns="0" rtlCol="0" anchor="t"/>
           <a:lstStyle/>
           <a:p>
-            <a:pPr algn="ctr" indent="0" marL="0">
+            <a:pPr marL="0" indent="0" algn="ctr">
               <a:buNone/>
             </a:pPr>
             <a:r>
@@ -2621,7 +2480,7 @@
           <a:bodyPr wrap="square" lIns="0" tIns="0" rIns="0" bIns="0" rtlCol="0" anchor="t"/>
           <a:lstStyle/>
           <a:p>
-            <a:pPr algn="l" indent="0" marL="0">
+            <a:pPr marL="0" indent="0" algn="l">
               <a:buNone/>
             </a:pPr>
             <a:r>
@@ -2670,7 +2529,7 @@
           <a:bodyPr wrap="square" rtlCol="0" anchor="ctr"/>
           <a:lstStyle/>
           <a:p>
-            <a:pPr indent="0" marL="0">
+            <a:pPr marL="0" indent="0">
               <a:buNone/>
             </a:pPr>
             <a:endParaRPr lang="en-US" dirty="0"/>
@@ -2698,7 +2557,7 @@
           <a:bodyPr wrap="square" lIns="0" tIns="0" rIns="0" bIns="0" rtlCol="0" anchor="t"/>
           <a:lstStyle/>
           <a:p>
-            <a:pPr algn="ctr" indent="0" marL="0">
+            <a:pPr marL="0" indent="0" algn="ctr">
               <a:spcAft>
                 <a:spcPts val="400"/>
               </a:spcAft>
@@ -2740,7 +2599,7 @@
           <a:bodyPr wrap="square" lIns="0" tIns="0" rIns="0" bIns="0" rtlCol="0" anchor="t"/>
           <a:lstStyle/>
           <a:p>
-            <a:pPr algn="ctr" indent="0" marL="0">
+            <a:pPr marL="0" indent="0" algn="ctr">
               <a:buNone/>
             </a:pPr>
             <a:r>
@@ -2779,7 +2638,7 @@
           <a:bodyPr wrap="square" lIns="0" tIns="0" rIns="0" bIns="0" rtlCol="0" anchor="t"/>
           <a:lstStyle/>
           <a:p>
-            <a:pPr algn="l" indent="0" marL="0">
+            <a:pPr marL="0" indent="0" algn="l">
               <a:buNone/>
             </a:pPr>
             <a:r>
@@ -2828,7 +2687,7 @@
           <a:bodyPr wrap="square" rtlCol="0" anchor="ctr"/>
           <a:lstStyle/>
           <a:p>
-            <a:pPr indent="0" marL="0">
+            <a:pPr marL="0" indent="0">
               <a:buNone/>
             </a:pPr>
             <a:endParaRPr lang="en-US" dirty="0"/>
@@ -2856,7 +2715,7 @@
           <a:bodyPr wrap="square" lIns="0" tIns="0" rIns="0" bIns="0" rtlCol="0" anchor="t"/>
           <a:lstStyle/>
           <a:p>
-            <a:pPr algn="ctr" indent="0" marL="0">
+            <a:pPr marL="0" indent="0" algn="ctr">
               <a:spcAft>
                 <a:spcPts val="400"/>
               </a:spcAft>
@@ -2898,7 +2757,7 @@
           <a:bodyPr wrap="square" lIns="0" tIns="0" rIns="0" bIns="0" rtlCol="0" anchor="t"/>
           <a:lstStyle/>
           <a:p>
-            <a:pPr algn="ctr" indent="0" marL="0">
+            <a:pPr marL="0" indent="0" algn="ctr">
               <a:buNone/>
             </a:pPr>
             <a:r>
@@ -2945,7 +2804,7 @@
           <a:bodyPr wrap="square" rtlCol="0" anchor="ctr"/>
           <a:lstStyle/>
           <a:p>
-            <a:pPr indent="0" marL="0">
+            <a:pPr marL="0" indent="0">
               <a:buNone/>
             </a:pPr>
             <a:endParaRPr lang="en-US" dirty="0"/>
@@ -2973,7 +2832,7 @@
           <a:bodyPr wrap="square" lIns="0" tIns="0" rIns="0" bIns="0" rtlCol="0" anchor="t"/>
           <a:lstStyle/>
           <a:p>
-            <a:pPr algn="ctr" indent="0" marL="0">
+            <a:pPr marL="0" indent="0" algn="ctr">
               <a:buNone/>
             </a:pPr>
             <a:r>
@@ -3012,7 +2871,7 @@
           <a:bodyPr wrap="square" lIns="0" tIns="0" rIns="0" bIns="0" rtlCol="0" anchor="t"/>
           <a:lstStyle/>
           <a:p>
-            <a:pPr algn="ctr" indent="0" marL="0">
+            <a:pPr marL="0" indent="0" algn="ctr">
               <a:spcBef>
                 <a:spcPts val="300"/>
               </a:spcBef>
@@ -3062,7 +2921,7 @@
           <a:bodyPr wrap="square" rtlCol="0" anchor="ctr"/>
           <a:lstStyle/>
           <a:p>
-            <a:pPr indent="0" marL="0">
+            <a:pPr marL="0" indent="0">
               <a:buNone/>
             </a:pPr>
             <a:endParaRPr lang="en-US" dirty="0"/>
@@ -3090,7 +2949,7 @@
           <a:bodyPr wrap="square" lIns="0" tIns="0" rIns="0" bIns="0" rtlCol="0" anchor="t"/>
           <a:lstStyle/>
           <a:p>
-            <a:pPr algn="ctr" indent="0" marL="0">
+            <a:pPr marL="0" indent="0" algn="ctr">
               <a:buNone/>
             </a:pPr>
             <a:r>
@@ -3129,7 +2988,7 @@
           <a:bodyPr wrap="square" lIns="0" tIns="0" rIns="0" bIns="0" rtlCol="0" anchor="t"/>
           <a:lstStyle/>
           <a:p>
-            <a:pPr algn="ctr" indent="0" marL="0">
+            <a:pPr marL="0" indent="0" algn="ctr">
               <a:spcBef>
                 <a:spcPts val="300"/>
               </a:spcBef>
@@ -3179,7 +3038,7 @@
           <a:bodyPr wrap="square" rtlCol="0" anchor="ctr"/>
           <a:lstStyle/>
           <a:p>
-            <a:pPr indent="0" marL="0">
+            <a:pPr marL="0" indent="0">
               <a:buNone/>
             </a:pPr>
             <a:endParaRPr lang="en-US" dirty="0"/>
@@ -3207,7 +3066,7 @@
           <a:bodyPr wrap="square" lIns="0" tIns="0" rIns="0" bIns="0" rtlCol="0" anchor="t"/>
           <a:lstStyle/>
           <a:p>
-            <a:pPr algn="ctr" indent="0" marL="0">
+            <a:pPr marL="0" indent="0" algn="ctr">
               <a:buNone/>
             </a:pPr>
             <a:r>
@@ -3246,7 +3105,7 @@
           <a:bodyPr wrap="square" lIns="0" tIns="0" rIns="0" bIns="0" rtlCol="0" anchor="t"/>
           <a:lstStyle/>
           <a:p>
-            <a:pPr algn="ctr" indent="0" marL="0">
+            <a:pPr marL="0" indent="0" algn="ctr">
               <a:spcBef>
                 <a:spcPts val="300"/>
               </a:spcBef>
@@ -3277,12 +3136,141 @@
 
 <file path=ppt/slides/slide4.xml><?xml version="1.0" encoding="utf-8"?>
 <p:sld xmlns:a="http://schemas.openxmlformats.org/drawingml/2006/main" xmlns:r="http://schemas.openxmlformats.org/officeDocument/2006/relationships" xmlns:p="http://schemas.openxmlformats.org/presentationml/2006/main">
+  <p:cSld>
+    <p:bg>
+      <p:bgPr>
+        <a:solidFill>
+          <a:srgbClr val="0D1117"/>
+        </a:solidFill>
+        <a:effectLst/>
+      </p:bgPr>
+    </p:bg>
+    <p:spTree>
+      <p:nvGrpSpPr>
+        <p:cNvPr id="1" name="">
+          <a:extLst>
+            <a:ext uri="{FF2B5EF4-FFF2-40B4-BE49-F238E27FC236}">
+              <a16:creationId xmlns:a16="http://schemas.microsoft.com/office/drawing/2014/main" id="{C55F9FCE-89B5-6F6E-1F64-9832D57920A0}"/>
+            </a:ext>
+          </a:extLst>
+        </p:cNvPr>
+        <p:cNvGrpSpPr/>
+        <p:nvPr/>
+      </p:nvGrpSpPr>
+      <p:grpSpPr>
+        <a:xfrm>
+          <a:off x="0" y="0"/>
+          <a:ext cx="0" cy="0"/>
+          <a:chOff x="0" y="0"/>
+          <a:chExt cx="0" cy="0"/>
+        </a:xfrm>
+      </p:grpSpPr>
+      <p:sp>
+        <p:nvSpPr>
+          <p:cNvPr id="2" name="Text 0">
+            <a:extLst>
+              <a:ext uri="{FF2B5EF4-FFF2-40B4-BE49-F238E27FC236}">
+                <a16:creationId xmlns:a16="http://schemas.microsoft.com/office/drawing/2014/main" id="{D58B5B13-544C-FD60-7592-E55C48938015}"/>
+              </a:ext>
+            </a:extLst>
+          </p:cNvPr>
+          <p:cNvSpPr/>
+          <p:nvPr/>
+        </p:nvSpPr>
+        <p:spPr>
+          <a:xfrm>
+            <a:off x="0" y="0"/>
+            <a:ext cx="9144000" cy="50750"/>
+          </a:xfrm>
+          <a:prstGeom prst="rect">
+            <a:avLst/>
+          </a:prstGeom>
+          <a:solidFill>
+            <a:srgbClr val="00D4AA"/>
+          </a:solidFill>
+          <a:ln/>
+        </p:spPr>
+        <p:txBody>
+          <a:bodyPr wrap="square" rtlCol="0" anchor="ctr"/>
+          <a:lstStyle/>
+          <a:p>
+            <a:pPr marL="0" indent="0">
+              <a:buNone/>
+            </a:pPr>
+            <a:endParaRPr lang="en-US" dirty="0"/>
+          </a:p>
+        </p:txBody>
+      </p:sp>
+      <p:sp>
+        <p:nvSpPr>
+          <p:cNvPr id="3" name="Text 1">
+            <a:extLst>
+              <a:ext uri="{FF2B5EF4-FFF2-40B4-BE49-F238E27FC236}">
+                <a16:creationId xmlns:a16="http://schemas.microsoft.com/office/drawing/2014/main" id="{4F9A937B-3B4E-75E0-7370-A9A7F5C0A8C0}"/>
+              </a:ext>
+            </a:extLst>
+          </p:cNvPr>
+          <p:cNvSpPr/>
+          <p:nvPr/>
+        </p:nvSpPr>
+        <p:spPr>
+          <a:xfrm>
+            <a:off x="3136934" y="2015899"/>
+            <a:ext cx="2870132" cy="1111701"/>
+          </a:xfrm>
+          <a:prstGeom prst="rect">
+            <a:avLst/>
+          </a:prstGeom>
+          <a:noFill/>
+          <a:ln/>
+        </p:spPr>
+        <p:txBody>
+          <a:bodyPr wrap="square" lIns="0" tIns="0" rIns="0" bIns="0" rtlCol="0" anchor="t"/>
+          <a:lstStyle/>
+          <a:p>
+            <a:pPr marL="0" indent="0" algn="l">
+              <a:spcAft>
+                <a:spcPts val="600"/>
+              </a:spcAft>
+              <a:buNone/>
+            </a:pPr>
+            <a:r>
+              <a:rPr lang="en-US" sz="7200" b="1" dirty="0">
+                <a:solidFill>
+                  <a:srgbClr val="00D4AA"/>
+                </a:solidFill>
+                <a:latin typeface="Arial" pitchFamily="34" charset="0"/>
+                <a:ea typeface="Arial" pitchFamily="34" charset="-122"/>
+                <a:cs typeface="Arial" pitchFamily="34" charset="-120"/>
+              </a:rPr>
+              <a:t>DEMO</a:t>
+            </a:r>
+            <a:endParaRPr lang="en-US" sz="7200" dirty="0"/>
+          </a:p>
+        </p:txBody>
+      </p:sp>
+    </p:spTree>
+    <p:extLst>
+      <p:ext uri="{BB962C8B-B14F-4D97-AF65-F5344CB8AC3E}">
+        <p14:creationId xmlns:p14="http://schemas.microsoft.com/office/powerpoint/2010/main" val="93022435"/>
+      </p:ext>
+    </p:extLst>
+  </p:cSld>
+  <p:clrMapOvr>
+    <a:masterClrMapping/>
+  </p:clrMapOvr>
+</p:sld>
+</file>
+
+<file path=ppt/slides/slide5.xml><?xml version="1.0" encoding="utf-8"?>
+<p:sld xmlns:a="http://schemas.openxmlformats.org/drawingml/2006/main" xmlns:r="http://schemas.openxmlformats.org/officeDocument/2006/relationships" xmlns:p="http://schemas.openxmlformats.org/presentationml/2006/main">
   <p:cSld name="Slide 4">
     <p:bg>
       <p:bgPr>
         <a:solidFill>
           <a:srgbClr val="0D1117"/>
         </a:solidFill>
+        <a:effectLst/>
       </p:bgPr>
     </p:bg>
     <p:spTree>
@@ -3322,7 +3310,7 @@
           <a:bodyPr wrap="square" rtlCol="0" anchor="ctr"/>
           <a:lstStyle/>
           <a:p>
-            <a:pPr indent="0" marL="0">
+            <a:pPr marL="0" indent="0">
               <a:buNone/>
             </a:pPr>
             <a:endParaRPr lang="en-US" dirty="0"/>
@@ -3350,7 +3338,7 @@
           <a:bodyPr wrap="square" lIns="0" tIns="0" rIns="0" bIns="0" rtlCol="0" anchor="t"/>
           <a:lstStyle/>
           <a:p>
-            <a:pPr algn="l" indent="0" marL="0">
+            <a:pPr marL="0" indent="0" algn="l">
               <a:buNone/>
             </a:pPr>
             <a:r>
@@ -3389,7 +3377,7 @@
           <a:bodyPr wrap="square" lIns="0" tIns="0" rIns="0" bIns="0" rtlCol="0" anchor="t"/>
           <a:lstStyle/>
           <a:p>
-            <a:pPr algn="l" indent="0" marL="0">
+            <a:pPr marL="0" indent="0" algn="l">
               <a:spcBef>
                 <a:spcPts val="400"/>
               </a:spcBef>
@@ -3439,7 +3427,7 @@
           <a:bodyPr wrap="square" rtlCol="0" anchor="ctr"/>
           <a:lstStyle/>
           <a:p>
-            <a:pPr indent="0" marL="0">
+            <a:pPr marL="0" indent="0">
               <a:buNone/>
             </a:pPr>
             <a:endParaRPr lang="en-US" dirty="0"/>
@@ -3467,7 +3455,7 @@
           <a:bodyPr wrap="square" lIns="0" tIns="0" rIns="0" bIns="0" rtlCol="0" anchor="t"/>
           <a:lstStyle/>
           <a:p>
-            <a:pPr algn="l" indent="0" marL="0">
+            <a:pPr marL="0" indent="0" algn="l">
               <a:spcAft>
                 <a:spcPts val="600"/>
               </a:spcAft>
@@ -3509,7 +3497,7 @@
           <a:bodyPr wrap="square" lIns="0" tIns="0" rIns="0" bIns="0" rtlCol="0" anchor="t"/>
           <a:lstStyle/>
           <a:p>
-            <a:pPr algn="l" indent="0" marL="0">
+            <a:pPr marL="0" indent="0" algn="l">
               <a:buNone/>
             </a:pPr>
             <a:r>
@@ -3558,7 +3546,7 @@
           <a:bodyPr wrap="square" rtlCol="0" anchor="ctr"/>
           <a:lstStyle/>
           <a:p>
-            <a:pPr indent="0" marL="0">
+            <a:pPr marL="0" indent="0">
               <a:buNone/>
             </a:pPr>
             <a:endParaRPr lang="en-US" dirty="0"/>
@@ -3586,7 +3574,7 @@
           <a:bodyPr wrap="square" lIns="0" tIns="0" rIns="0" bIns="0" rtlCol="0" anchor="t"/>
           <a:lstStyle/>
           <a:p>
-            <a:pPr algn="l" indent="0" marL="0">
+            <a:pPr marL="0" indent="0" algn="l">
               <a:spcAft>
                 <a:spcPts val="400"/>
               </a:spcAft>
@@ -3628,7 +3616,7 @@
           <a:bodyPr wrap="square" lIns="0" tIns="0" rIns="0" bIns="0" rtlCol="0" anchor="t"/>
           <a:lstStyle/>
           <a:p>
-            <a:pPr algn="l" indent="0" marL="0">
+            <a:pPr marL="0" indent="0" algn="l">
               <a:buNone/>
             </a:pPr>
             <a:r>
@@ -3667,7 +3655,7 @@
           <a:bodyPr wrap="square" lIns="0" tIns="0" rIns="0" bIns="0" rtlCol="0" anchor="t"/>
           <a:lstStyle/>
           <a:p>
-            <a:pPr algn="ctr" indent="0" marL="0">
+            <a:pPr marL="0" indent="0" algn="ctr">
               <a:buNone/>
             </a:pPr>
             <a:r>
@@ -3693,7 +3681,7 @@
 </p:sld>
 </file>
 
-<file path=ppt/slides/slide5.xml><?xml version="1.0" encoding="utf-8"?>
+<file path=ppt/slides/slide6.xml><?xml version="1.0" encoding="utf-8"?>
 <p:sld xmlns:a="http://schemas.openxmlformats.org/drawingml/2006/main" xmlns:r="http://schemas.openxmlformats.org/officeDocument/2006/relationships" xmlns:p="http://schemas.openxmlformats.org/presentationml/2006/main">
   <p:cSld name="Slide 5">
     <p:bg>
@@ -3701,6 +3689,7 @@
         <a:solidFill>
           <a:srgbClr val="0D1117"/>
         </a:solidFill>
+        <a:effectLst/>
       </p:bgPr>
     </p:bg>
     <p:spTree>
@@ -3740,7 +3729,7 @@
           <a:bodyPr wrap="square" rtlCol="0" anchor="ctr"/>
           <a:lstStyle/>
           <a:p>
-            <a:pPr indent="0" marL="0">
+            <a:pPr marL="0" indent="0">
               <a:buNone/>
             </a:pPr>
             <a:endParaRPr lang="en-US" dirty="0"/>
@@ -3768,7 +3757,7 @@
           <a:bodyPr wrap="square" lIns="0" tIns="0" rIns="0" bIns="0" rtlCol="0" anchor="t"/>
           <a:lstStyle/>
           <a:p>
-            <a:pPr algn="l" indent="0" marL="0">
+            <a:pPr marL="0" indent="0" algn="l">
               <a:buNone/>
             </a:pPr>
             <a:r>
@@ -3815,7 +3804,7 @@
           <a:bodyPr wrap="square" rtlCol="0" anchor="ctr"/>
           <a:lstStyle/>
           <a:p>
-            <a:pPr indent="0" marL="0">
+            <a:pPr marL="0" indent="0">
               <a:buNone/>
             </a:pPr>
             <a:endParaRPr lang="en-US" dirty="0"/>
@@ -3843,7 +3832,7 @@
           <a:bodyPr wrap="square" lIns="0" tIns="0" rIns="0" bIns="0" rtlCol="0" anchor="t"/>
           <a:lstStyle/>
           <a:p>
-            <a:pPr algn="ctr" indent="0" marL="0">
+            <a:pPr marL="0" indent="0" algn="ctr">
               <a:buNone/>
             </a:pPr>
             <a:r>
@@ -3882,7 +3871,7 @@
           <a:bodyPr wrap="square" lIns="0" tIns="0" rIns="0" bIns="0" rtlCol="0" anchor="t"/>
           <a:lstStyle/>
           <a:p>
-            <a:pPr algn="ctr" indent="0" marL="0">
+            <a:pPr marL="0" indent="0" algn="ctr">
               <a:spcBef>
                 <a:spcPts val="300"/>
               </a:spcBef>
@@ -3932,7 +3921,7 @@
           <a:bodyPr wrap="square" rtlCol="0" anchor="ctr"/>
           <a:lstStyle/>
           <a:p>
-            <a:pPr indent="0" marL="0">
+            <a:pPr marL="0" indent="0">
               <a:buNone/>
             </a:pPr>
             <a:endParaRPr lang="en-US" dirty="0"/>
@@ -3960,7 +3949,7 @@
           <a:bodyPr wrap="square" lIns="0" tIns="0" rIns="0" bIns="0" rtlCol="0" anchor="t"/>
           <a:lstStyle/>
           <a:p>
-            <a:pPr algn="ctr" indent="0" marL="0">
+            <a:pPr marL="0" indent="0" algn="ctr">
               <a:buNone/>
             </a:pPr>
             <a:r>
@@ -3999,7 +3988,7 @@
           <a:bodyPr wrap="square" lIns="0" tIns="0" rIns="0" bIns="0" rtlCol="0" anchor="t"/>
           <a:lstStyle/>
           <a:p>
-            <a:pPr algn="ctr" indent="0" marL="0">
+            <a:pPr marL="0" indent="0" algn="ctr">
               <a:spcBef>
                 <a:spcPts val="300"/>
               </a:spcBef>
@@ -4049,7 +4038,7 @@
           <a:bodyPr wrap="square" rtlCol="0" anchor="ctr"/>
           <a:lstStyle/>
           <a:p>
-            <a:pPr indent="0" marL="0">
+            <a:pPr marL="0" indent="0">
               <a:buNone/>
             </a:pPr>
             <a:endParaRPr lang="en-US" dirty="0"/>
@@ -4077,7 +4066,7 @@
           <a:bodyPr wrap="square" lIns="0" tIns="0" rIns="0" bIns="0" rtlCol="0" anchor="t"/>
           <a:lstStyle/>
           <a:p>
-            <a:pPr algn="ctr" indent="0" marL="0">
+            <a:pPr marL="0" indent="0" algn="ctr">
               <a:buNone/>
             </a:pPr>
             <a:r>
@@ -4116,7 +4105,7 @@
           <a:bodyPr wrap="square" lIns="0" tIns="0" rIns="0" bIns="0" rtlCol="0" anchor="t"/>
           <a:lstStyle/>
           <a:p>
-            <a:pPr algn="ctr" indent="0" marL="0">
+            <a:pPr marL="0" indent="0" algn="ctr">
               <a:spcBef>
                 <a:spcPts val="300"/>
               </a:spcBef>
@@ -4166,7 +4155,7 @@
           <a:bodyPr wrap="square" rtlCol="0" anchor="ctr"/>
           <a:lstStyle/>
           <a:p>
-            <a:pPr indent="0" marL="0">
+            <a:pPr marL="0" indent="0">
               <a:buNone/>
             </a:pPr>
             <a:endParaRPr lang="en-US" dirty="0"/>
@@ -4194,7 +4183,7 @@
           <a:bodyPr wrap="square" lIns="0" tIns="0" rIns="0" bIns="0" rtlCol="0" anchor="t"/>
           <a:lstStyle/>
           <a:p>
-            <a:pPr algn="ctr" indent="0" marL="0">
+            <a:pPr marL="0" indent="0" algn="ctr">
               <a:buNone/>
             </a:pPr>
             <a:r>
@@ -4233,7 +4222,7 @@
           <a:bodyPr wrap="square" lIns="0" tIns="0" rIns="0" bIns="0" rtlCol="0" anchor="t"/>
           <a:lstStyle/>
           <a:p>
-            <a:pPr algn="ctr" indent="0" marL="0">
+            <a:pPr marL="0" indent="0" algn="ctr">
               <a:spcBef>
                 <a:spcPts val="300"/>
               </a:spcBef>
@@ -4285,7 +4274,7 @@
           <a:bodyPr wrap="square" rtlCol="0" anchor="ctr"/>
           <a:lstStyle/>
           <a:p>
-            <a:pPr indent="0" marL="0">
+            <a:pPr marL="0" indent="0">
               <a:buNone/>
             </a:pPr>
             <a:endParaRPr lang="en-US" dirty="0"/>
@@ -4313,7 +4302,7 @@
           <a:bodyPr wrap="square" lIns="0" tIns="0" rIns="0" bIns="0" rtlCol="0" anchor="t"/>
           <a:lstStyle/>
           <a:p>
-            <a:pPr algn="l" indent="0" marL="0">
+            <a:pPr marL="0" indent="0" algn="l">
               <a:buNone/>
             </a:pPr>
             <a:r>
@@ -4362,7 +4351,7 @@
           <a:bodyPr wrap="square" rtlCol="0" anchor="ctr"/>
           <a:lstStyle/>
           <a:p>
-            <a:pPr indent="0" marL="0">
+            <a:pPr marL="0" indent="0">
               <a:buNone/>
             </a:pPr>
             <a:endParaRPr lang="en-US" dirty="0"/>
@@ -4390,7 +4379,7 @@
           <a:bodyPr wrap="square" lIns="0" tIns="0" rIns="0" bIns="0" rtlCol="0" anchor="t"/>
           <a:lstStyle/>
           <a:p>
-            <a:pPr algn="l" indent="0" marL="0">
+            <a:pPr marL="0" indent="0" algn="l">
               <a:buNone/>
             </a:pPr>
             <a:r>
@@ -4439,7 +4428,7 @@
           <a:bodyPr wrap="square" rtlCol="0" anchor="ctr"/>
           <a:lstStyle/>
           <a:p>
-            <a:pPr indent="0" marL="0">
+            <a:pPr marL="0" indent="0">
               <a:buNone/>
             </a:pPr>
             <a:endParaRPr lang="en-US" dirty="0"/>
@@ -4467,7 +4456,7 @@
           <a:bodyPr wrap="square" lIns="0" tIns="0" rIns="0" bIns="0" rtlCol="0" anchor="t"/>
           <a:lstStyle/>
           <a:p>
-            <a:pPr algn="l" indent="0" marL="0">
+            <a:pPr marL="0" indent="0" algn="l">
               <a:buNone/>
             </a:pPr>
             <a:r>
@@ -4516,7 +4505,7 @@
           <a:bodyPr wrap="square" rtlCol="0" anchor="ctr"/>
           <a:lstStyle/>
           <a:p>
-            <a:pPr indent="0" marL="0">
+            <a:pPr marL="0" indent="0">
               <a:buNone/>
             </a:pPr>
             <a:endParaRPr lang="en-US" dirty="0"/>
@@ -4544,7 +4533,7 @@
           <a:bodyPr wrap="square" lIns="0" tIns="0" rIns="0" bIns="0" rtlCol="0" anchor="t"/>
           <a:lstStyle/>
           <a:p>
-            <a:pPr algn="l" indent="0" marL="0">
+            <a:pPr marL="0" indent="0" algn="l">
               <a:buNone/>
             </a:pPr>
             <a:r>
@@ -4593,7 +4582,7 @@
           <a:bodyPr wrap="square" rtlCol="0" anchor="ctr"/>
           <a:lstStyle/>
           <a:p>
-            <a:pPr indent="0" marL="0">
+            <a:pPr marL="0" indent="0">
               <a:buNone/>
             </a:pPr>
             <a:endParaRPr lang="en-US" dirty="0"/>
@@ -4621,7 +4610,7 @@
           <a:bodyPr wrap="square" lIns="0" tIns="0" rIns="0" bIns="0" rtlCol="0" anchor="t"/>
           <a:lstStyle/>
           <a:p>
-            <a:pPr algn="l" indent="0" marL="0">
+            <a:pPr marL="0" indent="0" algn="l">
               <a:buNone/>
             </a:pPr>
             <a:r>
@@ -4670,7 +4659,7 @@
           <a:bodyPr wrap="square" rtlCol="0" anchor="ctr"/>
           <a:lstStyle/>
           <a:p>
-            <a:pPr indent="0" marL="0">
+            <a:pPr marL="0" indent="0">
               <a:buNone/>
             </a:pPr>
             <a:endParaRPr lang="en-US" dirty="0"/>
@@ -4698,7 +4687,7 @@
           <a:bodyPr wrap="square" lIns="0" tIns="0" rIns="0" bIns="0" rtlCol="0" anchor="t"/>
           <a:lstStyle/>
           <a:p>
-            <a:pPr algn="l" indent="0" marL="0">
+            <a:pPr marL="0" indent="0" algn="l">
               <a:buNone/>
             </a:pPr>
             <a:r>
@@ -4747,7 +4736,7 @@
           <a:bodyPr wrap="square" rtlCol="0" anchor="ctr"/>
           <a:lstStyle/>
           <a:p>
-            <a:pPr indent="0" marL="0">
+            <a:pPr marL="0" indent="0">
               <a:buNone/>
             </a:pPr>
             <a:endParaRPr lang="en-US" dirty="0"/>
@@ -4775,7 +4764,7 @@
           <a:bodyPr wrap="square" lIns="0" tIns="0" rIns="0" bIns="0" rtlCol="0" anchor="t"/>
           <a:lstStyle/>
           <a:p>
-            <a:pPr algn="l" indent="0" marL="0">
+            <a:pPr marL="0" indent="0" algn="l">
               <a:buNone/>
             </a:pPr>
             <a:r>
@@ -4824,7 +4813,7 @@
           <a:bodyPr wrap="square" rtlCol="0" anchor="ctr"/>
           <a:lstStyle/>
           <a:p>
-            <a:pPr indent="0" marL="0">
+            <a:pPr marL="0" indent="0">
               <a:buNone/>
             </a:pPr>
             <a:endParaRPr lang="en-US" dirty="0"/>
@@ -4852,7 +4841,7 @@
           <a:bodyPr wrap="square" lIns="0" tIns="0" rIns="0" bIns="0" rtlCol="0" anchor="t"/>
           <a:lstStyle/>
           <a:p>
-            <a:pPr algn="l" indent="0" marL="0">
+            <a:pPr marL="0" indent="0" algn="l">
               <a:buNone/>
             </a:pPr>
             <a:r>
@@ -4901,7 +4890,7 @@
           <a:bodyPr wrap="square" rtlCol="0" anchor="ctr"/>
           <a:lstStyle/>
           <a:p>
-            <a:pPr indent="0" marL="0">
+            <a:pPr marL="0" indent="0">
               <a:buNone/>
             </a:pPr>
             <a:endParaRPr lang="en-US" dirty="0"/>
@@ -4929,7 +4918,7 @@
           <a:bodyPr wrap="square" lIns="0" tIns="0" rIns="0" bIns="0" rtlCol="0" anchor="t"/>
           <a:lstStyle/>
           <a:p>
-            <a:pPr algn="l" indent="0" marL="0">
+            <a:pPr marL="0" indent="0" algn="l">
               <a:buNone/>
             </a:pPr>
             <a:r>
@@ -4978,7 +4967,7 @@
           <a:bodyPr wrap="square" rtlCol="0" anchor="ctr"/>
           <a:lstStyle/>
           <a:p>
-            <a:pPr indent="0" marL="0">
+            <a:pPr marL="0" indent="0">
               <a:buNone/>
             </a:pPr>
             <a:endParaRPr lang="en-US" dirty="0"/>
@@ -5006,7 +4995,7 @@
           <a:bodyPr wrap="square" lIns="0" tIns="0" rIns="0" bIns="0" rtlCol="0" anchor="t"/>
           <a:lstStyle/>
           <a:p>
-            <a:pPr algn="ctr" indent="0" marL="0">
+            <a:pPr marL="0" indent="0" algn="ctr">
               <a:buNone/>
             </a:pPr>
             <a:r>
@@ -5020,9 +5009,6 @@
               </a:rPr>
               <a:t>54% of rules are </a:t>
             </a:r>
-            <a:pPr algn="ctr" indent="0" marL="0">
-              <a:buNone/>
-            </a:pPr>
             <a:r>
               <a:rPr lang="en-US" sz="1300" b="1" dirty="0">
                 <a:solidFill>
@@ -5034,9 +5020,6 @@
               </a:rPr>
               <a:t>novel</a:t>
             </a:r>
-            <a:pPr algn="ctr" indent="0" marL="0">
-              <a:buNone/>
-            </a:pPr>
             <a:r>
               <a:rPr lang="en-US" sz="1300" dirty="0">
                 <a:solidFill>
@@ -5060,7 +5043,7 @@
 </p:sld>
 </file>
 
-<file path=ppt/slides/slide6.xml><?xml version="1.0" encoding="utf-8"?>
+<file path=ppt/slides/slide7.xml><?xml version="1.0" encoding="utf-8"?>
 <p:sld xmlns:a="http://schemas.openxmlformats.org/drawingml/2006/main" xmlns:r="http://schemas.openxmlformats.org/officeDocument/2006/relationships" xmlns:p="http://schemas.openxmlformats.org/presentationml/2006/main">
   <p:cSld name="Slide 6">
     <p:bg>
@@ -5068,6 +5051,7 @@
         <a:solidFill>
           <a:srgbClr val="0D1117"/>
         </a:solidFill>
+        <a:effectLst/>
       </p:bgPr>
     </p:bg>
     <p:spTree>
@@ -5107,7 +5091,7 @@
           <a:bodyPr wrap="square" rtlCol="0" anchor="ctr"/>
           <a:lstStyle/>
           <a:p>
-            <a:pPr indent="0" marL="0">
+            <a:pPr marL="0" indent="0">
               <a:buNone/>
             </a:pPr>
             <a:endParaRPr lang="en-US" dirty="0"/>
@@ -5122,20 +5106,20 @@
         </p:nvSpPr>
         <p:spPr>
           <a:xfrm>
-            <a:off x="633883" y="1009799"/>
-            <a:ext cx="7876234" cy="428625"/>
-          </a:xfrm>
-          <a:prstGeom prst="rect">
-            <a:avLst/>
-          </a:prstGeom>
-          <a:noFill/>
-          <a:ln/>
-        </p:spPr>
-        <p:txBody>
-          <a:bodyPr wrap="square" lIns="0" tIns="0" rIns="0" bIns="0" rtlCol="0" anchor="t"/>
-          <a:lstStyle/>
-          <a:p>
-            <a:pPr algn="ctr" indent="0" marL="0">
+            <a:off x="200607" y="943691"/>
+            <a:ext cx="4003923" cy="1073050"/>
+          </a:xfrm>
+          <a:prstGeom prst="rect">
+            <a:avLst/>
+          </a:prstGeom>
+          <a:noFill/>
+          <a:ln/>
+        </p:spPr>
+        <p:txBody>
+          <a:bodyPr wrap="square" lIns="0" tIns="0" rIns="0" bIns="0" rtlCol="0" anchor="t"/>
+          <a:lstStyle/>
+          <a:p>
+            <a:pPr marL="0" indent="0" algn="ctr">
               <a:buNone/>
             </a:pPr>
             <a:r>
@@ -5161,20 +5145,20 @@
         </p:nvSpPr>
         <p:spPr>
           <a:xfrm>
-            <a:off x="633883" y="1539925"/>
-            <a:ext cx="7876234" cy="238125"/>
-          </a:xfrm>
-          <a:prstGeom prst="rect">
-            <a:avLst/>
-          </a:prstGeom>
-          <a:noFill/>
-          <a:ln/>
-        </p:spPr>
-        <p:txBody>
-          <a:bodyPr wrap="square" lIns="0" tIns="0" rIns="0" bIns="0" rtlCol="0" anchor="t"/>
-          <a:lstStyle/>
-          <a:p>
-            <a:pPr algn="ctr" indent="0" marL="0">
+            <a:off x="146486" y="1913829"/>
+            <a:ext cx="4126124" cy="238125"/>
+          </a:xfrm>
+          <a:prstGeom prst="rect">
+            <a:avLst/>
+          </a:prstGeom>
+          <a:noFill/>
+          <a:ln/>
+        </p:spPr>
+        <p:txBody>
+          <a:bodyPr wrap="square" lIns="0" tIns="0" rIns="0" bIns="0" rtlCol="0" anchor="t"/>
+          <a:lstStyle/>
+          <a:p>
+            <a:pPr marL="0" indent="0" algn="ctr">
               <a:spcBef>
                 <a:spcPts val="800"/>
               </a:spcBef>
@@ -5203,8 +5187,8 @@
         </p:nvSpPr>
         <p:spPr>
           <a:xfrm>
-            <a:off x="711101" y="2082850"/>
-            <a:ext cx="7721798" cy="892076"/>
+            <a:off x="465051" y="2448791"/>
+            <a:ext cx="3625938" cy="892076"/>
           </a:xfrm>
           <a:prstGeom prst="roundRect">
             <a:avLst>
@@ -5226,7 +5210,7 @@
           <a:bodyPr wrap="square" rtlCol="0" anchor="ctr"/>
           <a:lstStyle/>
           <a:p>
-            <a:pPr indent="0" marL="0">
+            <a:pPr marL="0" indent="0">
               <a:buNone/>
             </a:pPr>
             <a:endParaRPr lang="en-US" dirty="0"/>
@@ -5241,20 +5225,20 @@
         </p:nvSpPr>
         <p:spPr>
           <a:xfrm>
-            <a:off x="954494" y="2295525"/>
-            <a:ext cx="7235011" cy="238125"/>
-          </a:xfrm>
-          <a:prstGeom prst="rect">
-            <a:avLst/>
-          </a:prstGeom>
-          <a:noFill/>
-          <a:ln/>
-        </p:spPr>
-        <p:txBody>
-          <a:bodyPr wrap="square" lIns="0" tIns="0" rIns="0" bIns="0" rtlCol="0" anchor="t"/>
-          <a:lstStyle/>
-          <a:p>
-            <a:pPr algn="ctr" indent="0" marL="0">
+            <a:off x="708444" y="2661466"/>
+            <a:ext cx="3002209" cy="882552"/>
+          </a:xfrm>
+          <a:prstGeom prst="rect">
+            <a:avLst/>
+          </a:prstGeom>
+          <a:noFill/>
+          <a:ln/>
+        </p:spPr>
+        <p:txBody>
+          <a:bodyPr wrap="square" lIns="0" tIns="0" rIns="0" bIns="0" rtlCol="0" anchor="t"/>
+          <a:lstStyle/>
+          <a:p>
+            <a:pPr marL="0" indent="0" algn="ctr">
               <a:buNone/>
             </a:pPr>
             <a:r>
@@ -5268,9 +5252,6 @@
               </a:rPr>
               <a:t>/init</a:t>
             </a:r>
-            <a:pPr algn="ctr" indent="0" marL="0">
-              <a:buNone/>
-            </a:pPr>
             <a:r>
               <a:rPr lang="en-US" sz="1600" dirty="0">
                 <a:solidFill>
@@ -5282,7 +5263,9 @@
               </a:rPr>
               <a:t> handles the inferrable. </a:t>
             </a:r>
-            <a:pPr algn="ctr" indent="0" marL="0">
+          </a:p>
+          <a:p>
+            <a:pPr marL="0" indent="0" algn="ctr">
               <a:buNone/>
             </a:pPr>
             <a:r>
@@ -5294,11 +5277,8 @@
                 <a:ea typeface="Arial" pitchFamily="34" charset="-122"/>
                 <a:cs typeface="Arial" pitchFamily="34" charset="-120"/>
               </a:rPr>
-              <a:t>Tacit</a:t>
-            </a:r>
-            <a:pPr algn="ctr" indent="0" marL="0">
-              <a:buNone/>
-            </a:pPr>
+              <a:t>tacit</a:t>
+            </a:r>
             <a:r>
               <a:rPr lang="en-US" sz="1600" dirty="0">
                 <a:solidFill>
@@ -5316,55 +5296,13 @@
       </p:sp>
       <p:sp>
         <p:nvSpPr>
-          <p:cNvPr id="7" name="Text 5"/>
-          <p:cNvSpPr/>
-          <p:nvPr/>
-        </p:nvSpPr>
-        <p:spPr>
-          <a:xfrm>
-            <a:off x="954494" y="2609850"/>
-            <a:ext cx="7235011" cy="152400"/>
-          </a:xfrm>
-          <a:prstGeom prst="rect">
-            <a:avLst/>
-          </a:prstGeom>
-          <a:noFill/>
-          <a:ln/>
-        </p:spPr>
-        <p:txBody>
-          <a:bodyPr wrap="square" lIns="0" tIns="0" rIns="0" bIns="0" rtlCol="0" anchor="t"/>
-          <a:lstStyle/>
-          <a:p>
-            <a:pPr algn="ctr" indent="0" marL="0">
-              <a:spcBef>
-                <a:spcPts val="600"/>
-              </a:spcBef>
-              <a:buNone/>
-            </a:pPr>
-            <a:r>
-              <a:rPr lang="en-US" sz="1100" dirty="0">
-                <a:solidFill>
-                  <a:srgbClr val="8B949E"/>
-                </a:solidFill>
-                <a:latin typeface="Arial" pitchFamily="34" charset="0"/>
-                <a:ea typeface="Arial" pitchFamily="34" charset="-122"/>
-                <a:cs typeface="Arial" pitchFamily="34" charset="-120"/>
-              </a:rPr>
-              <a:t>Native output: CLAUDE.md + .claude/rules/ — right where it belongs</a:t>
-            </a:r>
-            <a:endParaRPr lang="en-US" sz="1100" dirty="0"/>
-          </a:p>
-        </p:txBody>
-      </p:sp>
-      <p:sp>
-        <p:nvSpPr>
           <p:cNvPr id="8" name="Text 6"/>
           <p:cNvSpPr/>
           <p:nvPr/>
         </p:nvSpPr>
         <p:spPr>
           <a:xfrm>
-            <a:off x="2063800" y="3533626"/>
+            <a:off x="465051" y="3882885"/>
             <a:ext cx="1433364" cy="314325"/>
           </a:xfrm>
           <a:prstGeom prst="roundRect">
@@ -5387,7 +5325,7 @@
           <a:bodyPr wrap="square" rtlCol="0" anchor="ctr"/>
           <a:lstStyle/>
           <a:p>
-            <a:pPr indent="0" marL="0">
+            <a:pPr marL="0" indent="0">
               <a:buNone/>
             </a:pPr>
             <a:endParaRPr lang="en-US" dirty="0"/>
@@ -5402,7 +5340,7 @@
         </p:nvSpPr>
         <p:spPr>
           <a:xfrm>
-            <a:off x="2251025" y="3619351"/>
+            <a:off x="652276" y="3968610"/>
             <a:ext cx="1080090" cy="142875"/>
           </a:xfrm>
           <a:prstGeom prst="rect">
@@ -5415,7 +5353,7 @@
           <a:bodyPr wrap="square" lIns="0" tIns="0" rIns="0" bIns="0" rtlCol="0" anchor="t"/>
           <a:lstStyle/>
           <a:p>
-            <a:pPr algn="l" indent="0" marL="0">
+            <a:pPr marL="0" indent="0" algn="l">
               <a:buNone/>
             </a:pPr>
             <a:r>
@@ -5441,7 +5379,7 @@
         </p:nvSpPr>
         <p:spPr>
           <a:xfrm>
-            <a:off x="3624114" y="3533626"/>
+            <a:off x="2488221" y="3899567"/>
             <a:ext cx="889843" cy="314325"/>
           </a:xfrm>
           <a:prstGeom prst="roundRect">
@@ -5464,7 +5402,7 @@
           <a:bodyPr wrap="square" rtlCol="0" anchor="ctr"/>
           <a:lstStyle/>
           <a:p>
-            <a:pPr indent="0" marL="0">
+            <a:pPr marL="0" indent="0">
               <a:buNone/>
             </a:pPr>
             <a:endParaRPr lang="en-US" dirty="0"/>
@@ -5479,7 +5417,7 @@
         </p:nvSpPr>
         <p:spPr>
           <a:xfrm>
-            <a:off x="3811339" y="3619351"/>
+            <a:off x="2675446" y="3985292"/>
             <a:ext cx="525700" cy="142875"/>
           </a:xfrm>
           <a:prstGeom prst="rect">
@@ -5492,7 +5430,7 @@
           <a:bodyPr wrap="square" lIns="0" tIns="0" rIns="0" bIns="0" rtlCol="0" anchor="t"/>
           <a:lstStyle/>
           <a:p>
-            <a:pPr algn="l" indent="0" marL="0">
+            <a:pPr marL="0" indent="0" algn="l">
               <a:buNone/>
             </a:pPr>
             <a:r>
@@ -5512,184 +5450,29 @@
       </p:sp>
       <p:sp>
         <p:nvSpPr>
-          <p:cNvPr id="12" name="Text 10"/>
-          <p:cNvSpPr/>
-          <p:nvPr/>
-        </p:nvSpPr>
-        <p:spPr>
-          <a:xfrm>
-            <a:off x="4640907" y="3533626"/>
-            <a:ext cx="939254" cy="314325"/>
-          </a:xfrm>
-          <a:prstGeom prst="roundRect">
-            <a:avLst>
-              <a:gd name="adj" fmla="val 56566"/>
-            </a:avLst>
-          </a:prstGeom>
-          <a:solidFill>
-            <a:srgbClr val="00D4AA">
-              <a:alpha val="8000"/>
-            </a:srgbClr>
-          </a:solidFill>
-          <a:ln w="9525">
-            <a:solidFill>
-              <a:srgbClr val="00D4AA"/>
-            </a:solidFill>
-          </a:ln>
-        </p:spPr>
-        <p:txBody>
-          <a:bodyPr wrap="square" rtlCol="0" anchor="ctr"/>
-          <a:lstStyle/>
-          <a:p>
-            <a:pPr indent="0" marL="0">
-              <a:buNone/>
-            </a:pPr>
-            <a:endParaRPr lang="en-US" dirty="0"/>
-          </a:p>
-        </p:txBody>
-      </p:sp>
-      <p:sp>
-        <p:nvSpPr>
-          <p:cNvPr id="13" name="Text 11"/>
-          <p:cNvSpPr/>
-          <p:nvPr/>
-        </p:nvSpPr>
-        <p:spPr>
-          <a:xfrm>
-            <a:off x="4828133" y="3619351"/>
-            <a:ext cx="576099" cy="142875"/>
-          </a:xfrm>
-          <a:prstGeom prst="rect">
-            <a:avLst/>
-          </a:prstGeom>
-          <a:noFill/>
-          <a:ln/>
-        </p:spPr>
-        <p:txBody>
-          <a:bodyPr wrap="square" lIns="0" tIns="0" rIns="0" bIns="0" rtlCol="0" anchor="t"/>
-          <a:lstStyle/>
-          <a:p>
-            <a:pPr algn="l" indent="0" marL="0">
-              <a:buNone/>
-            </a:pPr>
-            <a:r>
-              <a:rPr lang="en-US" sz="1000" dirty="0">
-                <a:solidFill>
-                  <a:srgbClr val="00D4AA"/>
-                </a:solidFill>
-                <a:latin typeface="Arial" pitchFamily="34" charset="0"/>
-                <a:ea typeface="Arial" pitchFamily="34" charset="-122"/>
-                <a:cs typeface="Arial" pitchFamily="34" charset="-120"/>
-              </a:rPr>
-              <a:t>16 Agents</a:t>
-            </a:r>
-            <a:endParaRPr lang="en-US" sz="1000" dirty="0"/>
-          </a:p>
-        </p:txBody>
-      </p:sp>
-      <p:sp>
-        <p:nvSpPr>
-          <p:cNvPr id="14" name="Text 12"/>
-          <p:cNvSpPr/>
-          <p:nvPr/>
-        </p:nvSpPr>
-        <p:spPr>
-          <a:xfrm>
-            <a:off x="5707112" y="3533626"/>
-            <a:ext cx="1372939" cy="314325"/>
-          </a:xfrm>
-          <a:prstGeom prst="roundRect">
-            <a:avLst>
-              <a:gd name="adj" fmla="val 56566"/>
-            </a:avLst>
-          </a:prstGeom>
-          <a:solidFill>
-            <a:srgbClr val="00D4AA">
-              <a:alpha val="8000"/>
-            </a:srgbClr>
-          </a:solidFill>
-          <a:ln w="9525">
-            <a:solidFill>
-              <a:srgbClr val="00D4AA"/>
-            </a:solidFill>
-          </a:ln>
-        </p:spPr>
-        <p:txBody>
-          <a:bodyPr wrap="square" rtlCol="0" anchor="ctr"/>
-          <a:lstStyle/>
-          <a:p>
-            <a:pPr indent="0" marL="0">
-              <a:buNone/>
-            </a:pPr>
-            <a:endParaRPr lang="en-US" dirty="0"/>
-          </a:p>
-        </p:txBody>
-      </p:sp>
-      <p:sp>
-        <p:nvSpPr>
-          <p:cNvPr id="15" name="Text 13"/>
-          <p:cNvSpPr/>
-          <p:nvPr/>
-        </p:nvSpPr>
-        <p:spPr>
-          <a:xfrm>
-            <a:off x="5894338" y="3619351"/>
-            <a:ext cx="1018458" cy="142875"/>
-          </a:xfrm>
-          <a:prstGeom prst="rect">
-            <a:avLst/>
-          </a:prstGeom>
-          <a:noFill/>
-          <a:ln/>
-        </p:spPr>
-        <p:txBody>
-          <a:bodyPr wrap="square" lIns="0" tIns="0" rIns="0" bIns="0" rtlCol="0" anchor="t"/>
-          <a:lstStyle/>
-          <a:p>
-            <a:pPr algn="l" indent="0" marL="0">
-              <a:buNone/>
-            </a:pPr>
-            <a:r>
-              <a:rPr lang="en-US" sz="1000" dirty="0">
-                <a:solidFill>
-                  <a:srgbClr val="00D4AA"/>
-                </a:solidFill>
-                <a:latin typeface="Arial" pitchFamily="34" charset="0"/>
-                <a:ea typeface="Arial" pitchFamily="34" charset="-122"/>
-                <a:cs typeface="Arial" pitchFamily="34" charset="-120"/>
-              </a:rPr>
-              <a:t>FastAPI + SwiftUI</a:t>
-            </a:r>
-            <a:endParaRPr lang="en-US" sz="1000" dirty="0"/>
-          </a:p>
-        </p:txBody>
-      </p:sp>
-      <p:sp>
-        <p:nvSpPr>
           <p:cNvPr id="16" name="Text 14"/>
           <p:cNvSpPr/>
           <p:nvPr/>
         </p:nvSpPr>
         <p:spPr>
           <a:xfrm>
-            <a:off x="633883" y="4051102"/>
-            <a:ext cx="7876234" cy="133350"/>
-          </a:xfrm>
-          <a:prstGeom prst="rect">
-            <a:avLst/>
-          </a:prstGeom>
-          <a:noFill/>
-          <a:ln/>
-        </p:spPr>
-        <p:txBody>
-          <a:bodyPr wrap="square" lIns="0" tIns="0" rIns="0" bIns="0" rtlCol="0" anchor="t"/>
-          <a:lstStyle/>
-          <a:p>
-            <a:pPr algn="ctr" indent="0" marL="0">
+            <a:off x="-530196" y="4756176"/>
+            <a:ext cx="4655414" cy="203151"/>
+          </a:xfrm>
+          <a:prstGeom prst="rect">
+            <a:avLst/>
+          </a:prstGeom>
+          <a:noFill/>
+          <a:ln/>
+        </p:spPr>
+        <p:txBody>
+          <a:bodyPr wrap="square" lIns="0" tIns="0" rIns="0" bIns="0" rtlCol="0" anchor="t"/>
+          <a:lstStyle/>
+          <a:p>
+            <a:pPr algn="ctr">
               <a:spcBef>
                 <a:spcPts val="1600"/>
               </a:spcBef>
-              <a:buNone/>
             </a:pPr>
             <a:r>
               <a:rPr lang="en-US" sz="900" dirty="0">
@@ -5700,12 +5483,45 @@
                 <a:ea typeface="Arial" pitchFamily="34" charset="-122"/>
                 <a:cs typeface="Arial" pitchFamily="34" charset="-120"/>
               </a:rPr>
-              <a:t>This presentation was also generated with Claude</a:t>
-            </a:r>
-            <a:endParaRPr lang="en-US" sz="900" dirty="0"/>
-          </a:p>
-        </p:txBody>
-      </p:sp>
+              <a:t>This presentation was also generated with Claude </a:t>
+            </a:r>
+            <a:r>
+              <a:rPr lang="en-US" sz="900" dirty="0"/>
+              <a:t>🤖</a:t>
+            </a:r>
+          </a:p>
+        </p:txBody>
+      </p:sp>
+      <p:pic>
+        <p:nvPicPr>
+          <p:cNvPr id="19" name="Picture 18">
+            <a:extLst>
+              <a:ext uri="{FF2B5EF4-FFF2-40B4-BE49-F238E27FC236}">
+                <a16:creationId xmlns:a16="http://schemas.microsoft.com/office/drawing/2014/main" id="{D4BEC1F7-553C-6644-E590-7362404C5512}"/>
+              </a:ext>
+            </a:extLst>
+          </p:cNvPr>
+          <p:cNvPicPr>
+            <a:picLocks noChangeAspect="1"/>
+          </p:cNvPicPr>
+          <p:nvPr/>
+        </p:nvPicPr>
+        <p:blipFill>
+          <a:blip r:embed="rId3"/>
+          <a:stretch>
+            <a:fillRect/>
+          </a:stretch>
+        </p:blipFill>
+        <p:spPr>
+          <a:xfrm>
+            <a:off x="4513957" y="1434"/>
+            <a:ext cx="4622800" cy="5105400"/>
+          </a:xfrm>
+          <a:prstGeom prst="rect">
+            <a:avLst/>
+          </a:prstGeom>
+        </p:spPr>
+      </p:pic>
     </p:spTree>
   </p:cSld>
   <p:clrMapOvr>
@@ -6007,4 +5823,319 @@
     </a:ext>
   </a:extLst>
 </a:theme>
+</file>
+
+<file path=ppt/theme/theme2.xml><?xml version="1.0" encoding="utf-8"?>
+<a:theme xmlns:a="http://schemas.openxmlformats.org/drawingml/2006/main" name="Office Theme">
+  <a:themeElements>
+    <a:clrScheme name="Office">
+      <a:dk1>
+        <a:sysClr val="windowText" lastClr="000000"/>
+      </a:dk1>
+      <a:lt1>
+        <a:sysClr val="window" lastClr="FFFFFF"/>
+      </a:lt1>
+      <a:dk2>
+        <a:srgbClr val="0E2841"/>
+      </a:dk2>
+      <a:lt2>
+        <a:srgbClr val="E8E8E8"/>
+      </a:lt2>
+      <a:accent1>
+        <a:srgbClr val="156082"/>
+      </a:accent1>
+      <a:accent2>
+        <a:srgbClr val="E97132"/>
+      </a:accent2>
+      <a:accent3>
+        <a:srgbClr val="196B24"/>
+      </a:accent3>
+      <a:accent4>
+        <a:srgbClr val="0F9ED5"/>
+      </a:accent4>
+      <a:accent5>
+        <a:srgbClr val="A02B93"/>
+      </a:accent5>
+      <a:accent6>
+        <a:srgbClr val="4EA72E"/>
+      </a:accent6>
+      <a:hlink>
+        <a:srgbClr val="467886"/>
+      </a:hlink>
+      <a:folHlink>
+        <a:srgbClr val="96607D"/>
+      </a:folHlink>
+    </a:clrScheme>
+    <a:fontScheme name="Office">
+      <a:majorFont>
+        <a:latin typeface="Aptos Display" panose="02110004020202020204"/>
+        <a:ea typeface=""/>
+        <a:cs typeface=""/>
+        <a:font script="Jpan" typeface="游ゴシック Light"/>
+        <a:font script="Hang" typeface="맑은 고딕"/>
+        <a:font script="Hans" typeface="等线 Light"/>
+        <a:font script="Hant" typeface="新細明體"/>
+        <a:font script="Arab" typeface="Times New Roman"/>
+        <a:font script="Hebr" typeface="Times New Roman"/>
+        <a:font script="Thai" typeface="Angsana New"/>
+        <a:font script="Ethi" typeface="Nyala"/>
+        <a:font script="Beng" typeface="Vrinda"/>
+        <a:font script="Gujr" typeface="Shruti"/>
+        <a:font script="Khmr" typeface="MoolBoran"/>
+        <a:font script="Knda" typeface="Tunga"/>
+        <a:font script="Guru" typeface="Raavi"/>
+        <a:font script="Cans" typeface="Euphemia"/>
+        <a:font script="Cher" typeface="Plantagenet Cherokee"/>
+        <a:font script="Yiii" typeface="Microsoft Yi Baiti"/>
+        <a:font script="Tibt" typeface="Microsoft Himalaya"/>
+        <a:font script="Thaa" typeface="MV Boli"/>
+        <a:font script="Deva" typeface="Mangal"/>
+        <a:font script="Telu" typeface="Gautami"/>
+        <a:font script="Taml" typeface="Latha"/>
+        <a:font script="Syrc" typeface="Estrangelo Edessa"/>
+        <a:font script="Orya" typeface="Kalinga"/>
+        <a:font script="Mlym" typeface="Kartika"/>
+        <a:font script="Laoo" typeface="DokChampa"/>
+        <a:font script="Sinh" typeface="Iskoola Pota"/>
+        <a:font script="Mong" typeface="Mongolian Baiti"/>
+        <a:font script="Viet" typeface="Times New Roman"/>
+        <a:font script="Uigh" typeface="Microsoft Uighur"/>
+        <a:font script="Geor" typeface="Sylfaen"/>
+        <a:font script="Armn" typeface="Arial"/>
+        <a:font script="Bugi" typeface="Leelawadee UI"/>
+        <a:font script="Bopo" typeface="Microsoft JhengHei"/>
+        <a:font script="Java" typeface="Javanese Text"/>
+        <a:font script="Lisu" typeface="Segoe UI"/>
+        <a:font script="Mymr" typeface="Myanmar Text"/>
+        <a:font script="Nkoo" typeface="Ebrima"/>
+        <a:font script="Olck" typeface="Nirmala UI"/>
+        <a:font script="Osma" typeface="Ebrima"/>
+        <a:font script="Phag" typeface="Phagspa"/>
+        <a:font script="Syrn" typeface="Estrangelo Edessa"/>
+        <a:font script="Syrj" typeface="Estrangelo Edessa"/>
+        <a:font script="Syre" typeface="Estrangelo Edessa"/>
+        <a:font script="Sora" typeface="Nirmala UI"/>
+        <a:font script="Tale" typeface="Microsoft Tai Le"/>
+        <a:font script="Talu" typeface="Microsoft New Tai Lue"/>
+        <a:font script="Tfng" typeface="Ebrima"/>
+      </a:majorFont>
+      <a:minorFont>
+        <a:latin typeface="Aptos" panose="02110004020202020204"/>
+        <a:ea typeface=""/>
+        <a:cs typeface=""/>
+        <a:font script="Jpan" typeface="游ゴシック"/>
+        <a:font script="Hang" typeface="맑은 고딕"/>
+        <a:font script="Hans" typeface="等线"/>
+        <a:font script="Hant" typeface="新細明體"/>
+        <a:font script="Arab" typeface="Arial"/>
+        <a:font script="Hebr" typeface="Arial"/>
+        <a:font script="Thai" typeface="Cordia New"/>
+        <a:font script="Ethi" typeface="Nyala"/>
+        <a:font script="Beng" typeface="Vrinda"/>
+        <a:font script="Gujr" typeface="Shruti"/>
+        <a:font script="Khmr" typeface="DaunPenh"/>
+        <a:font script="Knda" typeface="Tunga"/>
+        <a:font script="Guru" typeface="Raavi"/>
+        <a:font script="Cans" typeface="Euphemia"/>
+        <a:font script="Cher" typeface="Plantagenet Cherokee"/>
+        <a:font script="Yiii" typeface="Microsoft Yi Baiti"/>
+        <a:font script="Tibt" typeface="Microsoft Himalaya"/>
+        <a:font script="Thaa" typeface="MV Boli"/>
+        <a:font script="Deva" typeface="Mangal"/>
+        <a:font script="Telu" typeface="Gautami"/>
+        <a:font script="Taml" typeface="Latha"/>
+        <a:font script="Syrc" typeface="Estrangelo Edessa"/>
+        <a:font script="Orya" typeface="Kalinga"/>
+        <a:font script="Mlym" typeface="Kartika"/>
+        <a:font script="Laoo" typeface="DokChampa"/>
+        <a:font script="Sinh" typeface="Iskoola Pota"/>
+        <a:font script="Mong" typeface="Mongolian Baiti"/>
+        <a:font script="Viet" typeface="Arial"/>
+        <a:font script="Uigh" typeface="Microsoft Uighur"/>
+        <a:font script="Geor" typeface="Sylfaen"/>
+        <a:font script="Armn" typeface="Arial"/>
+        <a:font script="Bugi" typeface="Leelawadee UI"/>
+        <a:font script="Bopo" typeface="Microsoft JhengHei"/>
+        <a:font script="Java" typeface="Javanese Text"/>
+        <a:font script="Lisu" typeface="Segoe UI"/>
+        <a:font script="Mymr" typeface="Myanmar Text"/>
+        <a:font script="Nkoo" typeface="Ebrima"/>
+        <a:font script="Olck" typeface="Nirmala UI"/>
+        <a:font script="Osma" typeface="Ebrima"/>
+        <a:font script="Phag" typeface="Phagspa"/>
+        <a:font script="Syrn" typeface="Estrangelo Edessa"/>
+        <a:font script="Syrj" typeface="Estrangelo Edessa"/>
+        <a:font script="Syre" typeface="Estrangelo Edessa"/>
+        <a:font script="Sora" typeface="Nirmala UI"/>
+        <a:font script="Tale" typeface="Microsoft Tai Le"/>
+        <a:font script="Talu" typeface="Microsoft New Tai Lue"/>
+        <a:font script="Tfng" typeface="Ebrima"/>
+      </a:minorFont>
+    </a:fontScheme>
+    <a:fmtScheme name="Office">
+      <a:fillStyleLst>
+        <a:solidFill>
+          <a:schemeClr val="phClr"/>
+        </a:solidFill>
+        <a:gradFill rotWithShape="1">
+          <a:gsLst>
+            <a:gs pos="0">
+              <a:schemeClr val="phClr">
+                <a:lumMod val="110000"/>
+                <a:satMod val="105000"/>
+                <a:tint val="67000"/>
+              </a:schemeClr>
+            </a:gs>
+            <a:gs pos="50000">
+              <a:schemeClr val="phClr">
+                <a:lumMod val="105000"/>
+                <a:satMod val="103000"/>
+                <a:tint val="73000"/>
+              </a:schemeClr>
+            </a:gs>
+            <a:gs pos="100000">
+              <a:schemeClr val="phClr">
+                <a:lumMod val="105000"/>
+                <a:satMod val="109000"/>
+                <a:tint val="81000"/>
+              </a:schemeClr>
+            </a:gs>
+          </a:gsLst>
+          <a:lin ang="5400000" scaled="0"/>
+        </a:gradFill>
+        <a:gradFill rotWithShape="1">
+          <a:gsLst>
+            <a:gs pos="0">
+              <a:schemeClr val="phClr">
+                <a:satMod val="103000"/>
+                <a:lumMod val="102000"/>
+                <a:tint val="94000"/>
+              </a:schemeClr>
+            </a:gs>
+            <a:gs pos="50000">
+              <a:schemeClr val="phClr">
+                <a:satMod val="110000"/>
+                <a:lumMod val="100000"/>
+                <a:shade val="100000"/>
+              </a:schemeClr>
+            </a:gs>
+            <a:gs pos="100000">
+              <a:schemeClr val="phClr">
+                <a:lumMod val="99000"/>
+                <a:satMod val="120000"/>
+                <a:shade val="78000"/>
+              </a:schemeClr>
+            </a:gs>
+          </a:gsLst>
+          <a:lin ang="5400000" scaled="0"/>
+        </a:gradFill>
+      </a:fillStyleLst>
+      <a:lnStyleLst>
+        <a:ln w="12700" cap="flat" cmpd="sng" algn="ctr">
+          <a:solidFill>
+            <a:schemeClr val="phClr"/>
+          </a:solidFill>
+          <a:prstDash val="solid"/>
+          <a:miter lim="800000"/>
+        </a:ln>
+        <a:ln w="19050" cap="flat" cmpd="sng" algn="ctr">
+          <a:solidFill>
+            <a:schemeClr val="phClr"/>
+          </a:solidFill>
+          <a:prstDash val="solid"/>
+          <a:miter lim="800000"/>
+        </a:ln>
+        <a:ln w="25400" cap="flat" cmpd="sng" algn="ctr">
+          <a:solidFill>
+            <a:schemeClr val="phClr"/>
+          </a:solidFill>
+          <a:prstDash val="solid"/>
+          <a:miter lim="800000"/>
+        </a:ln>
+      </a:lnStyleLst>
+      <a:effectStyleLst>
+        <a:effectStyle>
+          <a:effectLst/>
+        </a:effectStyle>
+        <a:effectStyle>
+          <a:effectLst/>
+        </a:effectStyle>
+        <a:effectStyle>
+          <a:effectLst>
+            <a:outerShdw blurRad="57150" dist="19050" dir="5400000" algn="ctr" rotWithShape="0">
+              <a:srgbClr val="000000">
+                <a:alpha val="63000"/>
+              </a:srgbClr>
+            </a:outerShdw>
+          </a:effectLst>
+        </a:effectStyle>
+      </a:effectStyleLst>
+      <a:bgFillStyleLst>
+        <a:solidFill>
+          <a:schemeClr val="phClr"/>
+        </a:solidFill>
+        <a:solidFill>
+          <a:schemeClr val="phClr">
+            <a:tint val="95000"/>
+            <a:satMod val="170000"/>
+          </a:schemeClr>
+        </a:solidFill>
+        <a:gradFill rotWithShape="1">
+          <a:gsLst>
+            <a:gs pos="0">
+              <a:schemeClr val="phClr">
+                <a:tint val="93000"/>
+                <a:satMod val="150000"/>
+                <a:shade val="98000"/>
+                <a:lumMod val="102000"/>
+              </a:schemeClr>
+            </a:gs>
+            <a:gs pos="50000">
+              <a:schemeClr val="phClr">
+                <a:tint val="98000"/>
+                <a:satMod val="130000"/>
+                <a:shade val="90000"/>
+                <a:lumMod val="103000"/>
+              </a:schemeClr>
+            </a:gs>
+            <a:gs pos="100000">
+              <a:schemeClr val="phClr">
+                <a:shade val="63000"/>
+                <a:satMod val="120000"/>
+              </a:schemeClr>
+            </a:gs>
+          </a:gsLst>
+          <a:lin ang="5400000" scaled="0"/>
+        </a:gradFill>
+      </a:bgFillStyleLst>
+    </a:fmtScheme>
+  </a:themeElements>
+  <a:objectDefaults>
+    <a:lnDef>
+      <a:spPr/>
+      <a:bodyPr/>
+      <a:lstStyle/>
+      <a:style>
+        <a:lnRef idx="2">
+          <a:schemeClr val="accent1"/>
+        </a:lnRef>
+        <a:fillRef idx="0">
+          <a:schemeClr val="accent1"/>
+        </a:fillRef>
+        <a:effectRef idx="1">
+          <a:schemeClr val="accent1"/>
+        </a:effectRef>
+        <a:fontRef idx="minor">
+          <a:schemeClr val="tx1"/>
+        </a:fontRef>
+      </a:style>
+    </a:lnDef>
+  </a:objectDefaults>
+  <a:extraClrSchemeLst/>
+  <a:extLst>
+    <a:ext uri="{05A4C25C-085E-4340-85A3-A5531E510DB2}">
+      <thm15:themeFamily xmlns:thm15="http://schemas.microsoft.com/office/thememl/2012/main" name="Office Theme" id="{2E142A2C-CD16-42D6-873A-C26D2A0506FA}" vid="{1BDDFF52-6CD6-40A5-AB3C-68EB2F1E4D0A}"/>
+    </a:ext>
+  </a:extLst>
+</a:theme>
 </file>
</xml_diff>